<commit_message>
Finished off powerpoint storyboard
</commit_message>
<xml_diff>
--- a/StoryboardPresentation.pptx
+++ b/StoryboardPresentation.pptx
@@ -12,6 +12,30 @@
     <p:sldId id="258" r:id="rId6"/>
     <p:sldId id="261" r:id="rId7"/>
     <p:sldId id="262" r:id="rId8"/>
+    <p:sldId id="263" r:id="rId9"/>
+    <p:sldId id="264" r:id="rId10"/>
+    <p:sldId id="265" r:id="rId11"/>
+    <p:sldId id="266" r:id="rId12"/>
+    <p:sldId id="267" r:id="rId13"/>
+    <p:sldId id="268" r:id="rId14"/>
+    <p:sldId id="269" r:id="rId15"/>
+    <p:sldId id="270" r:id="rId16"/>
+    <p:sldId id="271" r:id="rId17"/>
+    <p:sldId id="272" r:id="rId18"/>
+    <p:sldId id="273" r:id="rId19"/>
+    <p:sldId id="274" r:id="rId20"/>
+    <p:sldId id="275" r:id="rId21"/>
+    <p:sldId id="276" r:id="rId22"/>
+    <p:sldId id="277" r:id="rId23"/>
+    <p:sldId id="278" r:id="rId24"/>
+    <p:sldId id="279" r:id="rId25"/>
+    <p:sldId id="281" r:id="rId26"/>
+    <p:sldId id="282" r:id="rId27"/>
+    <p:sldId id="283" r:id="rId28"/>
+    <p:sldId id="284" r:id="rId29"/>
+    <p:sldId id="285" r:id="rId30"/>
+    <p:sldId id="286" r:id="rId31"/>
+    <p:sldId id="287" r:id="rId32"/>
   </p:sldIdLst>
   <p:sldSz cx="9144000" cy="6858000" type="screen4x3"/>
   <p:notesSz cx="6858000" cy="9144000"/>
@@ -13080,6 +13104,1057 @@
 </p:sld>
 </file>
 
+<file path=ppt/slides/slide10.xml><?xml version="1.0" encoding="utf-8"?>
+<p:sld xmlns:a="http://schemas.openxmlformats.org/drawingml/2006/main" xmlns:r="http://schemas.openxmlformats.org/officeDocument/2006/relationships" xmlns:p="http://schemas.openxmlformats.org/presentationml/2006/main">
+  <p:cSld>
+    <p:spTree>
+      <p:nvGrpSpPr>
+        <p:cNvPr id="1" name=""/>
+        <p:cNvGrpSpPr/>
+        <p:nvPr/>
+      </p:nvGrpSpPr>
+      <p:grpSpPr>
+        <a:xfrm>
+          <a:off x="0" y="0"/>
+          <a:ext cx="0" cy="0"/>
+          <a:chOff x="0" y="0"/>
+          <a:chExt cx="0" cy="0"/>
+        </a:xfrm>
+      </p:grpSpPr>
+      <p:sp>
+        <p:nvSpPr>
+          <p:cNvPr id="2" name="Title 1"/>
+          <p:cNvSpPr>
+            <a:spLocks noGrp="1"/>
+          </p:cNvSpPr>
+          <p:nvPr>
+            <p:ph type="title"/>
+          </p:nvPr>
+        </p:nvSpPr>
+        <p:spPr/>
+        <p:txBody>
+          <a:bodyPr/>
+          <a:lstStyle/>
+          <a:p>
+            <a:r>
+              <a:rPr lang="en-US" dirty="0" smtClean="0"/>
+              <a:t>Getting to Questions</a:t>
+            </a:r>
+            <a:endParaRPr lang="en-US" dirty="0"/>
+          </a:p>
+        </p:txBody>
+      </p:sp>
+      <p:pic>
+        <p:nvPicPr>
+          <p:cNvPr id="3" name="Picture 2"/>
+          <p:cNvPicPr>
+            <a:picLocks noChangeAspect="1"/>
+          </p:cNvPicPr>
+          <p:nvPr/>
+        </p:nvPicPr>
+        <p:blipFill>
+          <a:blip r:embed="rId2"/>
+          <a:stretch>
+            <a:fillRect/>
+          </a:stretch>
+        </p:blipFill>
+        <p:spPr>
+          <a:xfrm>
+            <a:off x="1020298" y="1600200"/>
+            <a:ext cx="7034489" cy="4457951"/>
+          </a:xfrm>
+          <a:prstGeom prst="rect">
+            <a:avLst/>
+          </a:prstGeom>
+        </p:spPr>
+      </p:pic>
+    </p:spTree>
+    <p:extLst>
+      <p:ext uri="{BB962C8B-B14F-4D97-AF65-F5344CB8AC3E}">
+        <p14:creationId xmlns:p14="http://schemas.microsoft.com/office/powerpoint/2010/main" val="3251699988"/>
+      </p:ext>
+    </p:extLst>
+  </p:cSld>
+  <p:clrMapOvr>
+    <a:masterClrMapping/>
+  </p:clrMapOvr>
+  <mc:AlternateContent xmlns:mc="http://schemas.openxmlformats.org/markup-compatibility/2006">
+    <mc:Choice xmlns:p14="http://schemas.microsoft.com/office/powerpoint/2010/main" Requires="p14">
+      <p:transition spd="slow" p14:dur="2000"/>
+    </mc:Choice>
+    <mc:Fallback>
+      <p:transition xmlns:p14="http://schemas.microsoft.com/office/powerpoint/2010/main" spd="slow"/>
+    </mc:Fallback>
+  </mc:AlternateContent>
+</p:sld>
+</file>
+
+<file path=ppt/slides/slide11.xml><?xml version="1.0" encoding="utf-8"?>
+<p:sld xmlns:a="http://schemas.openxmlformats.org/drawingml/2006/main" xmlns:r="http://schemas.openxmlformats.org/officeDocument/2006/relationships" xmlns:p="http://schemas.openxmlformats.org/presentationml/2006/main">
+  <p:cSld>
+    <p:spTree>
+      <p:nvGrpSpPr>
+        <p:cNvPr id="1" name=""/>
+        <p:cNvGrpSpPr/>
+        <p:nvPr/>
+      </p:nvGrpSpPr>
+      <p:grpSpPr>
+        <a:xfrm>
+          <a:off x="0" y="0"/>
+          <a:ext cx="0" cy="0"/>
+          <a:chOff x="0" y="0"/>
+          <a:chExt cx="0" cy="0"/>
+        </a:xfrm>
+      </p:grpSpPr>
+      <p:sp>
+        <p:nvSpPr>
+          <p:cNvPr id="2" name="Title 1"/>
+          <p:cNvSpPr>
+            <a:spLocks noGrp="1"/>
+          </p:cNvSpPr>
+          <p:nvPr>
+            <p:ph type="title"/>
+          </p:nvPr>
+        </p:nvSpPr>
+        <p:spPr/>
+        <p:txBody>
+          <a:bodyPr/>
+          <a:lstStyle/>
+          <a:p>
+            <a:r>
+              <a:rPr lang="en-US" dirty="0" smtClean="0"/>
+              <a:t>Getting to Questions</a:t>
+            </a:r>
+            <a:endParaRPr lang="en-US" dirty="0"/>
+          </a:p>
+        </p:txBody>
+      </p:sp>
+      <p:pic>
+        <p:nvPicPr>
+          <p:cNvPr id="3" name="Picture 2"/>
+          <p:cNvPicPr>
+            <a:picLocks noChangeAspect="1"/>
+          </p:cNvPicPr>
+          <p:nvPr/>
+        </p:nvPicPr>
+        <p:blipFill>
+          <a:blip r:embed="rId2"/>
+          <a:stretch>
+            <a:fillRect/>
+          </a:stretch>
+        </p:blipFill>
+        <p:spPr>
+          <a:xfrm>
+            <a:off x="1868612" y="1093826"/>
+            <a:ext cx="2455962" cy="4945307"/>
+          </a:xfrm>
+          <a:prstGeom prst="rect">
+            <a:avLst/>
+          </a:prstGeom>
+        </p:spPr>
+      </p:pic>
+      <p:sp>
+        <p:nvSpPr>
+          <p:cNvPr id="4" name="TextBox 3"/>
+          <p:cNvSpPr txBox="1"/>
+          <p:nvPr/>
+        </p:nvSpPr>
+        <p:spPr>
+          <a:xfrm>
+            <a:off x="1868612" y="6098875"/>
+            <a:ext cx="2639064" cy="369332"/>
+          </a:xfrm>
+          <a:prstGeom prst="rect">
+            <a:avLst/>
+          </a:prstGeom>
+          <a:noFill/>
+        </p:spPr>
+        <p:txBody>
+          <a:bodyPr wrap="none" rtlCol="0">
+            <a:spAutoFit/>
+          </a:bodyPr>
+          <a:lstStyle/>
+          <a:p>
+            <a:r>
+              <a:rPr lang="en-US" dirty="0" smtClean="0"/>
+              <a:t>For the questions menu</a:t>
+            </a:r>
+            <a:endParaRPr lang="en-US" dirty="0"/>
+          </a:p>
+        </p:txBody>
+      </p:sp>
+    </p:spTree>
+    <p:extLst>
+      <p:ext uri="{BB962C8B-B14F-4D97-AF65-F5344CB8AC3E}">
+        <p14:creationId xmlns:p14="http://schemas.microsoft.com/office/powerpoint/2010/main" val="182048140"/>
+      </p:ext>
+    </p:extLst>
+  </p:cSld>
+  <p:clrMapOvr>
+    <a:masterClrMapping/>
+  </p:clrMapOvr>
+  <mc:AlternateContent xmlns:mc="http://schemas.openxmlformats.org/markup-compatibility/2006">
+    <mc:Choice xmlns:p14="http://schemas.microsoft.com/office/powerpoint/2010/main" Requires="p14">
+      <p:transition spd="slow" p14:dur="2000"/>
+    </mc:Choice>
+    <mc:Fallback>
+      <p:transition xmlns:p14="http://schemas.microsoft.com/office/powerpoint/2010/main" spd="slow"/>
+    </mc:Fallback>
+  </mc:AlternateContent>
+</p:sld>
+</file>
+
+<file path=ppt/slides/slide12.xml><?xml version="1.0" encoding="utf-8"?>
+<p:sld xmlns:a="http://schemas.openxmlformats.org/drawingml/2006/main" xmlns:r="http://schemas.openxmlformats.org/officeDocument/2006/relationships" xmlns:p="http://schemas.openxmlformats.org/presentationml/2006/main">
+  <p:cSld>
+    <p:spTree>
+      <p:nvGrpSpPr>
+        <p:cNvPr id="1" name=""/>
+        <p:cNvGrpSpPr/>
+        <p:nvPr/>
+      </p:nvGrpSpPr>
+      <p:grpSpPr>
+        <a:xfrm>
+          <a:off x="0" y="0"/>
+          <a:ext cx="0" cy="0"/>
+          <a:chOff x="0" y="0"/>
+          <a:chExt cx="0" cy="0"/>
+        </a:xfrm>
+      </p:grpSpPr>
+      <p:sp>
+        <p:nvSpPr>
+          <p:cNvPr id="2" name="Title 1"/>
+          <p:cNvSpPr>
+            <a:spLocks noGrp="1"/>
+          </p:cNvSpPr>
+          <p:nvPr>
+            <p:ph type="title"/>
+          </p:nvPr>
+        </p:nvSpPr>
+        <p:spPr/>
+        <p:txBody>
+          <a:bodyPr/>
+          <a:lstStyle/>
+          <a:p>
+            <a:r>
+              <a:rPr lang="en-US" dirty="0" smtClean="0"/>
+              <a:t>Sort Questions</a:t>
+            </a:r>
+            <a:endParaRPr lang="en-US" dirty="0"/>
+          </a:p>
+        </p:txBody>
+      </p:sp>
+      <p:pic>
+        <p:nvPicPr>
+          <p:cNvPr id="3" name="Picture 2"/>
+          <p:cNvPicPr>
+            <a:picLocks noChangeAspect="1"/>
+          </p:cNvPicPr>
+          <p:nvPr/>
+        </p:nvPicPr>
+        <p:blipFill>
+          <a:blip r:embed="rId2"/>
+          <a:stretch>
+            <a:fillRect/>
+          </a:stretch>
+        </p:blipFill>
+        <p:spPr>
+          <a:xfrm>
+            <a:off x="1119503" y="1573585"/>
+            <a:ext cx="7184870" cy="5072296"/>
+          </a:xfrm>
+          <a:prstGeom prst="rect">
+            <a:avLst/>
+          </a:prstGeom>
+        </p:spPr>
+      </p:pic>
+    </p:spTree>
+    <p:extLst>
+      <p:ext uri="{BB962C8B-B14F-4D97-AF65-F5344CB8AC3E}">
+        <p14:creationId xmlns:p14="http://schemas.microsoft.com/office/powerpoint/2010/main" val="2851366587"/>
+      </p:ext>
+    </p:extLst>
+  </p:cSld>
+  <p:clrMapOvr>
+    <a:masterClrMapping/>
+  </p:clrMapOvr>
+  <mc:AlternateContent xmlns:mc="http://schemas.openxmlformats.org/markup-compatibility/2006">
+    <mc:Choice xmlns:p14="http://schemas.microsoft.com/office/powerpoint/2010/main" Requires="p14">
+      <p:transition spd="slow" p14:dur="2000"/>
+    </mc:Choice>
+    <mc:Fallback>
+      <p:transition xmlns:p14="http://schemas.microsoft.com/office/powerpoint/2010/main" spd="slow"/>
+    </mc:Fallback>
+  </mc:AlternateContent>
+</p:sld>
+</file>
+
+<file path=ppt/slides/slide13.xml><?xml version="1.0" encoding="utf-8"?>
+<p:sld xmlns:a="http://schemas.openxmlformats.org/drawingml/2006/main" xmlns:r="http://schemas.openxmlformats.org/officeDocument/2006/relationships" xmlns:p="http://schemas.openxmlformats.org/presentationml/2006/main">
+  <p:cSld>
+    <p:spTree>
+      <p:nvGrpSpPr>
+        <p:cNvPr id="1" name=""/>
+        <p:cNvGrpSpPr/>
+        <p:nvPr/>
+      </p:nvGrpSpPr>
+      <p:grpSpPr>
+        <a:xfrm>
+          <a:off x="0" y="0"/>
+          <a:ext cx="0" cy="0"/>
+          <a:chOff x="0" y="0"/>
+          <a:chExt cx="0" cy="0"/>
+        </a:xfrm>
+      </p:grpSpPr>
+      <p:sp>
+        <p:nvSpPr>
+          <p:cNvPr id="2" name="Title 1"/>
+          <p:cNvSpPr>
+            <a:spLocks noGrp="1"/>
+          </p:cNvSpPr>
+          <p:nvPr>
+            <p:ph type="title"/>
+          </p:nvPr>
+        </p:nvSpPr>
+        <p:spPr/>
+        <p:txBody>
+          <a:bodyPr/>
+          <a:lstStyle/>
+          <a:p>
+            <a:r>
+              <a:rPr lang="en-US" dirty="0" smtClean="0"/>
+              <a:t>Sort Questions</a:t>
+            </a:r>
+            <a:endParaRPr lang="en-US" dirty="0"/>
+          </a:p>
+        </p:txBody>
+      </p:sp>
+      <p:pic>
+        <p:nvPicPr>
+          <p:cNvPr id="3" name="Picture 2"/>
+          <p:cNvPicPr>
+            <a:picLocks noChangeAspect="1"/>
+          </p:cNvPicPr>
+          <p:nvPr/>
+        </p:nvPicPr>
+        <p:blipFill>
+          <a:blip r:embed="rId2"/>
+          <a:stretch>
+            <a:fillRect/>
+          </a:stretch>
+        </p:blipFill>
+        <p:spPr>
+          <a:xfrm>
+            <a:off x="1423189" y="1320211"/>
+            <a:ext cx="2665424" cy="5036442"/>
+          </a:xfrm>
+          <a:prstGeom prst="rect">
+            <a:avLst/>
+          </a:prstGeom>
+        </p:spPr>
+      </p:pic>
+      <p:sp>
+        <p:nvSpPr>
+          <p:cNvPr id="4" name="TextBox 3"/>
+          <p:cNvSpPr txBox="1"/>
+          <p:nvPr/>
+        </p:nvSpPr>
+        <p:spPr>
+          <a:xfrm>
+            <a:off x="4160121" y="2590289"/>
+            <a:ext cx="3894666" cy="646331"/>
+          </a:xfrm>
+          <a:prstGeom prst="rect">
+            <a:avLst/>
+          </a:prstGeom>
+          <a:noFill/>
+        </p:spPr>
+        <p:txBody>
+          <a:bodyPr wrap="none" rtlCol="0">
+            <a:spAutoFit/>
+          </a:bodyPr>
+          <a:lstStyle/>
+          <a:p>
+            <a:r>
+              <a:rPr lang="en-US" dirty="0" smtClean="0"/>
+              <a:t>This is the menu that pops up when </a:t>
+            </a:r>
+          </a:p>
+          <a:p>
+            <a:r>
+              <a:rPr lang="en-US" dirty="0" smtClean="0"/>
+              <a:t>You click the sort by option</a:t>
+            </a:r>
+            <a:endParaRPr lang="en-US" dirty="0"/>
+          </a:p>
+        </p:txBody>
+      </p:sp>
+    </p:spTree>
+    <p:extLst>
+      <p:ext uri="{BB962C8B-B14F-4D97-AF65-F5344CB8AC3E}">
+        <p14:creationId xmlns:p14="http://schemas.microsoft.com/office/powerpoint/2010/main" val="1747830041"/>
+      </p:ext>
+    </p:extLst>
+  </p:cSld>
+  <p:clrMapOvr>
+    <a:masterClrMapping/>
+  </p:clrMapOvr>
+  <mc:AlternateContent xmlns:mc="http://schemas.openxmlformats.org/markup-compatibility/2006">
+    <mc:Choice xmlns:p14="http://schemas.microsoft.com/office/powerpoint/2010/main" Requires="p14">
+      <p:transition spd="slow" p14:dur="2000"/>
+    </mc:Choice>
+    <mc:Fallback>
+      <p:transition xmlns:p14="http://schemas.microsoft.com/office/powerpoint/2010/main" spd="slow"/>
+    </mc:Fallback>
+  </mc:AlternateContent>
+</p:sld>
+</file>
+
+<file path=ppt/slides/slide14.xml><?xml version="1.0" encoding="utf-8"?>
+<p:sld xmlns:a="http://schemas.openxmlformats.org/drawingml/2006/main" xmlns:r="http://schemas.openxmlformats.org/officeDocument/2006/relationships" xmlns:p="http://schemas.openxmlformats.org/presentationml/2006/main">
+  <p:cSld>
+    <p:spTree>
+      <p:nvGrpSpPr>
+        <p:cNvPr id="1" name=""/>
+        <p:cNvGrpSpPr/>
+        <p:nvPr/>
+      </p:nvGrpSpPr>
+      <p:grpSpPr>
+        <a:xfrm>
+          <a:off x="0" y="0"/>
+          <a:ext cx="0" cy="0"/>
+          <a:chOff x="0" y="0"/>
+          <a:chExt cx="0" cy="0"/>
+        </a:xfrm>
+      </p:grpSpPr>
+      <p:sp>
+        <p:nvSpPr>
+          <p:cNvPr id="2" name="Title 1"/>
+          <p:cNvSpPr>
+            <a:spLocks noGrp="1"/>
+          </p:cNvSpPr>
+          <p:nvPr>
+            <p:ph type="title"/>
+          </p:nvPr>
+        </p:nvSpPr>
+        <p:spPr/>
+        <p:txBody>
+          <a:bodyPr/>
+          <a:lstStyle/>
+          <a:p>
+            <a:r>
+              <a:rPr lang="en-US" dirty="0" smtClean="0"/>
+              <a:t>Search Questions</a:t>
+            </a:r>
+            <a:endParaRPr lang="en-US" dirty="0"/>
+          </a:p>
+        </p:txBody>
+      </p:sp>
+      <p:pic>
+        <p:nvPicPr>
+          <p:cNvPr id="3" name="Picture 2"/>
+          <p:cNvPicPr>
+            <a:picLocks noChangeAspect="1"/>
+          </p:cNvPicPr>
+          <p:nvPr/>
+        </p:nvPicPr>
+        <p:blipFill>
+          <a:blip r:embed="rId2"/>
+          <a:stretch>
+            <a:fillRect/>
+          </a:stretch>
+        </p:blipFill>
+        <p:spPr>
+          <a:xfrm>
+            <a:off x="876300" y="1098854"/>
+            <a:ext cx="5661832" cy="5257800"/>
+          </a:xfrm>
+          <a:prstGeom prst="rect">
+            <a:avLst/>
+          </a:prstGeom>
+        </p:spPr>
+      </p:pic>
+      <p:sp>
+        <p:nvSpPr>
+          <p:cNvPr id="4" name="TextBox 3"/>
+          <p:cNvSpPr txBox="1"/>
+          <p:nvPr/>
+        </p:nvSpPr>
+        <p:spPr>
+          <a:xfrm>
+            <a:off x="4249865" y="4120109"/>
+            <a:ext cx="4254190" cy="923330"/>
+          </a:xfrm>
+          <a:prstGeom prst="rect">
+            <a:avLst/>
+          </a:prstGeom>
+          <a:noFill/>
+        </p:spPr>
+        <p:txBody>
+          <a:bodyPr wrap="none" rtlCol="0">
+            <a:spAutoFit/>
+          </a:bodyPr>
+          <a:lstStyle/>
+          <a:p>
+            <a:r>
+              <a:rPr lang="en-US" dirty="0" smtClean="0"/>
+              <a:t>This is where you can</a:t>
+            </a:r>
+          </a:p>
+          <a:p>
+            <a:r>
+              <a:rPr lang="en-US" dirty="0"/>
+              <a:t>e</a:t>
+            </a:r>
+            <a:r>
+              <a:rPr lang="en-US" dirty="0" smtClean="0"/>
+              <a:t>nter a search term to see </a:t>
+            </a:r>
+          </a:p>
+          <a:p>
+            <a:r>
+              <a:rPr lang="en-US" dirty="0" smtClean="0"/>
+              <a:t>which questions and answers come up</a:t>
+            </a:r>
+          </a:p>
+        </p:txBody>
+      </p:sp>
+    </p:spTree>
+    <p:extLst>
+      <p:ext uri="{BB962C8B-B14F-4D97-AF65-F5344CB8AC3E}">
+        <p14:creationId xmlns:p14="http://schemas.microsoft.com/office/powerpoint/2010/main" val="1281917089"/>
+      </p:ext>
+    </p:extLst>
+  </p:cSld>
+  <p:clrMapOvr>
+    <a:masterClrMapping/>
+  </p:clrMapOvr>
+  <mc:AlternateContent xmlns:mc="http://schemas.openxmlformats.org/markup-compatibility/2006">
+    <mc:Choice xmlns:p14="http://schemas.microsoft.com/office/powerpoint/2010/main" Requires="p14">
+      <p:transition spd="slow" p14:dur="2000"/>
+    </mc:Choice>
+    <mc:Fallback>
+      <p:transition xmlns:p14="http://schemas.microsoft.com/office/powerpoint/2010/main" spd="slow"/>
+    </mc:Fallback>
+  </mc:AlternateContent>
+</p:sld>
+</file>
+
+<file path=ppt/slides/slide15.xml><?xml version="1.0" encoding="utf-8"?>
+<p:sld xmlns:a="http://schemas.openxmlformats.org/drawingml/2006/main" xmlns:r="http://schemas.openxmlformats.org/officeDocument/2006/relationships" xmlns:p="http://schemas.openxmlformats.org/presentationml/2006/main">
+  <p:cSld>
+    <p:spTree>
+      <p:nvGrpSpPr>
+        <p:cNvPr id="1" name=""/>
+        <p:cNvGrpSpPr/>
+        <p:nvPr/>
+      </p:nvGrpSpPr>
+      <p:grpSpPr>
+        <a:xfrm>
+          <a:off x="0" y="0"/>
+          <a:ext cx="0" cy="0"/>
+          <a:chOff x="0" y="0"/>
+          <a:chExt cx="0" cy="0"/>
+        </a:xfrm>
+      </p:grpSpPr>
+      <p:sp>
+        <p:nvSpPr>
+          <p:cNvPr id="2" name="Title 1"/>
+          <p:cNvSpPr>
+            <a:spLocks noGrp="1"/>
+          </p:cNvSpPr>
+          <p:nvPr>
+            <p:ph type="title"/>
+          </p:nvPr>
+        </p:nvSpPr>
+        <p:spPr/>
+        <p:txBody>
+          <a:bodyPr/>
+          <a:lstStyle/>
+          <a:p>
+            <a:r>
+              <a:rPr lang="en-US" dirty="0" smtClean="0"/>
+              <a:t>Selecting a Question</a:t>
+            </a:r>
+            <a:endParaRPr lang="en-US" dirty="0"/>
+          </a:p>
+        </p:txBody>
+      </p:sp>
+      <p:pic>
+        <p:nvPicPr>
+          <p:cNvPr id="3" name="Picture 2"/>
+          <p:cNvPicPr>
+            <a:picLocks noChangeAspect="1"/>
+          </p:cNvPicPr>
+          <p:nvPr/>
+        </p:nvPicPr>
+        <p:blipFill>
+          <a:blip r:embed="rId2"/>
+          <a:stretch>
+            <a:fillRect/>
+          </a:stretch>
+        </p:blipFill>
+        <p:spPr>
+          <a:xfrm>
+            <a:off x="879125" y="1173277"/>
+            <a:ext cx="7325159" cy="5547433"/>
+          </a:xfrm>
+          <a:prstGeom prst="rect">
+            <a:avLst/>
+          </a:prstGeom>
+        </p:spPr>
+      </p:pic>
+    </p:spTree>
+    <p:extLst>
+      <p:ext uri="{BB962C8B-B14F-4D97-AF65-F5344CB8AC3E}">
+        <p14:creationId xmlns:p14="http://schemas.microsoft.com/office/powerpoint/2010/main" val="2240086916"/>
+      </p:ext>
+    </p:extLst>
+  </p:cSld>
+  <p:clrMapOvr>
+    <a:masterClrMapping/>
+  </p:clrMapOvr>
+  <mc:AlternateContent xmlns:mc="http://schemas.openxmlformats.org/markup-compatibility/2006">
+    <mc:Choice xmlns:p14="http://schemas.microsoft.com/office/powerpoint/2010/main" Requires="p14">
+      <p:transition spd="slow" p14:dur="2000"/>
+    </mc:Choice>
+    <mc:Fallback>
+      <p:transition xmlns:p14="http://schemas.microsoft.com/office/powerpoint/2010/main" spd="slow"/>
+    </mc:Fallback>
+  </mc:AlternateContent>
+</p:sld>
+</file>
+
+<file path=ppt/slides/slide16.xml><?xml version="1.0" encoding="utf-8"?>
+<p:sld xmlns:a="http://schemas.openxmlformats.org/drawingml/2006/main" xmlns:r="http://schemas.openxmlformats.org/officeDocument/2006/relationships" xmlns:p="http://schemas.openxmlformats.org/presentationml/2006/main">
+  <p:cSld>
+    <p:spTree>
+      <p:nvGrpSpPr>
+        <p:cNvPr id="1" name=""/>
+        <p:cNvGrpSpPr/>
+        <p:nvPr/>
+      </p:nvGrpSpPr>
+      <p:grpSpPr>
+        <a:xfrm>
+          <a:off x="0" y="0"/>
+          <a:ext cx="0" cy="0"/>
+          <a:chOff x="0" y="0"/>
+          <a:chExt cx="0" cy="0"/>
+        </a:xfrm>
+      </p:grpSpPr>
+      <p:sp>
+        <p:nvSpPr>
+          <p:cNvPr id="2" name="Title 1"/>
+          <p:cNvSpPr>
+            <a:spLocks noGrp="1"/>
+          </p:cNvSpPr>
+          <p:nvPr>
+            <p:ph type="title"/>
+          </p:nvPr>
+        </p:nvSpPr>
+        <p:spPr/>
+        <p:txBody>
+          <a:bodyPr/>
+          <a:lstStyle/>
+          <a:p>
+            <a:r>
+              <a:rPr lang="en-US" dirty="0" smtClean="0"/>
+              <a:t>Question Screen</a:t>
+            </a:r>
+            <a:endParaRPr lang="en-US" dirty="0"/>
+          </a:p>
+        </p:txBody>
+      </p:sp>
+      <p:sp>
+        <p:nvSpPr>
+          <p:cNvPr id="4" name="TextBox 3"/>
+          <p:cNvSpPr txBox="1"/>
+          <p:nvPr/>
+        </p:nvSpPr>
+        <p:spPr>
+          <a:xfrm>
+            <a:off x="4531236" y="2557002"/>
+            <a:ext cx="3288080" cy="369332"/>
+          </a:xfrm>
+          <a:prstGeom prst="rect">
+            <a:avLst/>
+          </a:prstGeom>
+          <a:noFill/>
+        </p:spPr>
+        <p:txBody>
+          <a:bodyPr wrap="none" rtlCol="0">
+            <a:spAutoFit/>
+          </a:bodyPr>
+          <a:lstStyle/>
+          <a:p>
+            <a:r>
+              <a:rPr lang="en-US" dirty="0" smtClean="0"/>
+              <a:t>Default Question screen view</a:t>
+            </a:r>
+            <a:endParaRPr lang="en-US" dirty="0"/>
+          </a:p>
+        </p:txBody>
+      </p:sp>
+      <p:pic>
+        <p:nvPicPr>
+          <p:cNvPr id="5" name="Picture 4"/>
+          <p:cNvPicPr>
+            <a:picLocks noChangeAspect="1"/>
+          </p:cNvPicPr>
+          <p:nvPr/>
+        </p:nvPicPr>
+        <p:blipFill>
+          <a:blip r:embed="rId2"/>
+          <a:stretch>
+            <a:fillRect/>
+          </a:stretch>
+        </p:blipFill>
+        <p:spPr>
+          <a:xfrm>
+            <a:off x="601457" y="1115471"/>
+            <a:ext cx="3021122" cy="5742529"/>
+          </a:xfrm>
+          <a:prstGeom prst="rect">
+            <a:avLst/>
+          </a:prstGeom>
+        </p:spPr>
+      </p:pic>
+      <p:sp>
+        <p:nvSpPr>
+          <p:cNvPr id="6" name="TextBox 5"/>
+          <p:cNvSpPr txBox="1"/>
+          <p:nvPr/>
+        </p:nvSpPr>
+        <p:spPr>
+          <a:xfrm>
+            <a:off x="3643876" y="3766490"/>
+            <a:ext cx="5500124" cy="369332"/>
+          </a:xfrm>
+          <a:prstGeom prst="rect">
+            <a:avLst/>
+          </a:prstGeom>
+          <a:noFill/>
+        </p:spPr>
+        <p:txBody>
+          <a:bodyPr wrap="none" rtlCol="0">
+            <a:spAutoFit/>
+          </a:bodyPr>
+          <a:lstStyle/>
+          <a:p>
+            <a:r>
+              <a:rPr lang="en-US" dirty="0" smtClean="0"/>
+              <a:t>Select the back button to return to the question list</a:t>
+            </a:r>
+            <a:endParaRPr lang="en-US" dirty="0"/>
+          </a:p>
+        </p:txBody>
+      </p:sp>
+    </p:spTree>
+    <p:extLst>
+      <p:ext uri="{BB962C8B-B14F-4D97-AF65-F5344CB8AC3E}">
+        <p14:creationId xmlns:p14="http://schemas.microsoft.com/office/powerpoint/2010/main" val="1968816498"/>
+      </p:ext>
+    </p:extLst>
+  </p:cSld>
+  <p:clrMapOvr>
+    <a:masterClrMapping/>
+  </p:clrMapOvr>
+  <mc:AlternateContent xmlns:mc="http://schemas.openxmlformats.org/markup-compatibility/2006">
+    <mc:Choice xmlns:p14="http://schemas.microsoft.com/office/powerpoint/2010/main" Requires="p14">
+      <p:transition spd="slow" p14:dur="2000"/>
+    </mc:Choice>
+    <mc:Fallback>
+      <p:transition xmlns:p14="http://schemas.microsoft.com/office/powerpoint/2010/main" spd="slow"/>
+    </mc:Fallback>
+  </mc:AlternateContent>
+</p:sld>
+</file>
+
+<file path=ppt/slides/slide17.xml><?xml version="1.0" encoding="utf-8"?>
+<p:sld xmlns:a="http://schemas.openxmlformats.org/drawingml/2006/main" xmlns:r="http://schemas.openxmlformats.org/officeDocument/2006/relationships" xmlns:p="http://schemas.openxmlformats.org/presentationml/2006/main">
+  <p:cSld>
+    <p:spTree>
+      <p:nvGrpSpPr>
+        <p:cNvPr id="1" name=""/>
+        <p:cNvGrpSpPr/>
+        <p:nvPr/>
+      </p:nvGrpSpPr>
+      <p:grpSpPr>
+        <a:xfrm>
+          <a:off x="0" y="0"/>
+          <a:ext cx="0" cy="0"/>
+          <a:chOff x="0" y="0"/>
+          <a:chExt cx="0" cy="0"/>
+        </a:xfrm>
+      </p:grpSpPr>
+      <p:sp>
+        <p:nvSpPr>
+          <p:cNvPr id="2" name="Title 1"/>
+          <p:cNvSpPr>
+            <a:spLocks noGrp="1"/>
+          </p:cNvSpPr>
+          <p:nvPr>
+            <p:ph type="title"/>
+          </p:nvPr>
+        </p:nvSpPr>
+        <p:spPr/>
+        <p:txBody>
+          <a:bodyPr/>
+          <a:lstStyle/>
+          <a:p>
+            <a:r>
+              <a:rPr lang="en-US" dirty="0" smtClean="0"/>
+              <a:t>Cache a Question</a:t>
+            </a:r>
+            <a:endParaRPr lang="en-US" dirty="0"/>
+          </a:p>
+        </p:txBody>
+      </p:sp>
+      <p:pic>
+        <p:nvPicPr>
+          <p:cNvPr id="4" name="Picture 3"/>
+          <p:cNvPicPr>
+            <a:picLocks noChangeAspect="1"/>
+          </p:cNvPicPr>
+          <p:nvPr/>
+        </p:nvPicPr>
+        <p:blipFill>
+          <a:blip r:embed="rId2"/>
+          <a:stretch>
+            <a:fillRect/>
+          </a:stretch>
+        </p:blipFill>
+        <p:spPr>
+          <a:xfrm>
+            <a:off x="1439760" y="1201276"/>
+            <a:ext cx="2614056" cy="5656724"/>
+          </a:xfrm>
+          <a:prstGeom prst="rect">
+            <a:avLst/>
+          </a:prstGeom>
+        </p:spPr>
+      </p:pic>
+    </p:spTree>
+    <p:extLst>
+      <p:ext uri="{BB962C8B-B14F-4D97-AF65-F5344CB8AC3E}">
+        <p14:creationId xmlns:p14="http://schemas.microsoft.com/office/powerpoint/2010/main" val="939652669"/>
+      </p:ext>
+    </p:extLst>
+  </p:cSld>
+  <p:clrMapOvr>
+    <a:masterClrMapping/>
+  </p:clrMapOvr>
+  <mc:AlternateContent xmlns:mc="http://schemas.openxmlformats.org/markup-compatibility/2006">
+    <mc:Choice xmlns:p14="http://schemas.microsoft.com/office/powerpoint/2010/main" Requires="p14">
+      <p:transition spd="slow" p14:dur="2000"/>
+    </mc:Choice>
+    <mc:Fallback>
+      <p:transition xmlns:p14="http://schemas.microsoft.com/office/powerpoint/2010/main" spd="slow"/>
+    </mc:Fallback>
+  </mc:AlternateContent>
+</p:sld>
+</file>
+
+<file path=ppt/slides/slide18.xml><?xml version="1.0" encoding="utf-8"?>
+<p:sld xmlns:a="http://schemas.openxmlformats.org/drawingml/2006/main" xmlns:r="http://schemas.openxmlformats.org/officeDocument/2006/relationships" xmlns:p="http://schemas.openxmlformats.org/presentationml/2006/main">
+  <p:cSld>
+    <p:spTree>
+      <p:nvGrpSpPr>
+        <p:cNvPr id="1" name=""/>
+        <p:cNvGrpSpPr/>
+        <p:nvPr/>
+      </p:nvGrpSpPr>
+      <p:grpSpPr>
+        <a:xfrm>
+          <a:off x="0" y="0"/>
+          <a:ext cx="0" cy="0"/>
+          <a:chOff x="0" y="0"/>
+          <a:chExt cx="0" cy="0"/>
+        </a:xfrm>
+      </p:grpSpPr>
+      <p:sp>
+        <p:nvSpPr>
+          <p:cNvPr id="2" name="Title 1"/>
+          <p:cNvSpPr>
+            <a:spLocks noGrp="1"/>
+          </p:cNvSpPr>
+          <p:nvPr>
+            <p:ph type="title"/>
+          </p:nvPr>
+        </p:nvSpPr>
+        <p:spPr/>
+        <p:txBody>
+          <a:bodyPr/>
+          <a:lstStyle/>
+          <a:p>
+            <a:r>
+              <a:rPr lang="en-US" dirty="0" smtClean="0"/>
+              <a:t>Answer a Question</a:t>
+            </a:r>
+            <a:endParaRPr lang="en-US" dirty="0"/>
+          </a:p>
+        </p:txBody>
+      </p:sp>
+      <p:pic>
+        <p:nvPicPr>
+          <p:cNvPr id="4" name="Picture 3"/>
+          <p:cNvPicPr>
+            <a:picLocks noChangeAspect="1"/>
+          </p:cNvPicPr>
+          <p:nvPr/>
+        </p:nvPicPr>
+        <p:blipFill>
+          <a:blip r:embed="rId2"/>
+          <a:stretch>
+            <a:fillRect/>
+          </a:stretch>
+        </p:blipFill>
+        <p:spPr>
+          <a:xfrm>
+            <a:off x="1152243" y="1239817"/>
+            <a:ext cx="5061042" cy="5497508"/>
+          </a:xfrm>
+          <a:prstGeom prst="rect">
+            <a:avLst/>
+          </a:prstGeom>
+        </p:spPr>
+      </p:pic>
+    </p:spTree>
+    <p:extLst>
+      <p:ext uri="{BB962C8B-B14F-4D97-AF65-F5344CB8AC3E}">
+        <p14:creationId xmlns:p14="http://schemas.microsoft.com/office/powerpoint/2010/main" val="1422031671"/>
+      </p:ext>
+    </p:extLst>
+  </p:cSld>
+  <p:clrMapOvr>
+    <a:masterClrMapping/>
+  </p:clrMapOvr>
+  <mc:AlternateContent xmlns:mc="http://schemas.openxmlformats.org/markup-compatibility/2006">
+    <mc:Choice xmlns:p14="http://schemas.microsoft.com/office/powerpoint/2010/main" Requires="p14">
+      <p:transition spd="slow" p14:dur="2000"/>
+    </mc:Choice>
+    <mc:Fallback>
+      <p:transition xmlns:p14="http://schemas.microsoft.com/office/powerpoint/2010/main" spd="slow"/>
+    </mc:Fallback>
+  </mc:AlternateContent>
+</p:sld>
+</file>
+
+<file path=ppt/slides/slide19.xml><?xml version="1.0" encoding="utf-8"?>
+<p:sld xmlns:a="http://schemas.openxmlformats.org/drawingml/2006/main" xmlns:r="http://schemas.openxmlformats.org/officeDocument/2006/relationships" xmlns:p="http://schemas.openxmlformats.org/presentationml/2006/main">
+  <p:cSld>
+    <p:spTree>
+      <p:nvGrpSpPr>
+        <p:cNvPr id="1" name=""/>
+        <p:cNvGrpSpPr/>
+        <p:nvPr/>
+      </p:nvGrpSpPr>
+      <p:grpSpPr>
+        <a:xfrm>
+          <a:off x="0" y="0"/>
+          <a:ext cx="0" cy="0"/>
+          <a:chOff x="0" y="0"/>
+          <a:chExt cx="0" cy="0"/>
+        </a:xfrm>
+      </p:grpSpPr>
+      <p:sp>
+        <p:nvSpPr>
+          <p:cNvPr id="2" name="Title 1"/>
+          <p:cNvSpPr>
+            <a:spLocks noGrp="1"/>
+          </p:cNvSpPr>
+          <p:nvPr>
+            <p:ph type="title"/>
+          </p:nvPr>
+        </p:nvSpPr>
+        <p:spPr/>
+        <p:txBody>
+          <a:bodyPr/>
+          <a:lstStyle/>
+          <a:p>
+            <a:r>
+              <a:rPr lang="en-US" dirty="0" smtClean="0"/>
+              <a:t>Answer a Question</a:t>
+            </a:r>
+            <a:endParaRPr lang="en-US" dirty="0"/>
+          </a:p>
+        </p:txBody>
+      </p:sp>
+      <p:sp>
+        <p:nvSpPr>
+          <p:cNvPr id="4" name="TextBox 3"/>
+          <p:cNvSpPr txBox="1"/>
+          <p:nvPr/>
+        </p:nvSpPr>
+        <p:spPr>
+          <a:xfrm>
+            <a:off x="4617055" y="3354624"/>
+            <a:ext cx="4008617" cy="369332"/>
+          </a:xfrm>
+          <a:prstGeom prst="rect">
+            <a:avLst/>
+          </a:prstGeom>
+          <a:noFill/>
+        </p:spPr>
+        <p:txBody>
+          <a:bodyPr wrap="none" rtlCol="0">
+            <a:spAutoFit/>
+          </a:bodyPr>
+          <a:lstStyle/>
+          <a:p>
+            <a:r>
+              <a:rPr lang="en-US" dirty="0" smtClean="0"/>
+              <a:t>Updated view with your new answer</a:t>
+            </a:r>
+            <a:endParaRPr lang="en-US" dirty="0"/>
+          </a:p>
+        </p:txBody>
+      </p:sp>
+      <p:pic>
+        <p:nvPicPr>
+          <p:cNvPr id="5" name="Picture 4"/>
+          <p:cNvPicPr>
+            <a:picLocks noChangeAspect="1"/>
+          </p:cNvPicPr>
+          <p:nvPr/>
+        </p:nvPicPr>
+        <p:blipFill>
+          <a:blip r:embed="rId2"/>
+          <a:stretch>
+            <a:fillRect/>
+          </a:stretch>
+        </p:blipFill>
+        <p:spPr>
+          <a:xfrm>
+            <a:off x="1262653" y="1222656"/>
+            <a:ext cx="2766108" cy="5257800"/>
+          </a:xfrm>
+          <a:prstGeom prst="rect">
+            <a:avLst/>
+          </a:prstGeom>
+        </p:spPr>
+      </p:pic>
+    </p:spTree>
+    <p:extLst>
+      <p:ext uri="{BB962C8B-B14F-4D97-AF65-F5344CB8AC3E}">
+        <p14:creationId xmlns:p14="http://schemas.microsoft.com/office/powerpoint/2010/main" val="2829222785"/>
+      </p:ext>
+    </p:extLst>
+  </p:cSld>
+  <p:clrMapOvr>
+    <a:masterClrMapping/>
+  </p:clrMapOvr>
+  <mc:AlternateContent xmlns:mc="http://schemas.openxmlformats.org/markup-compatibility/2006">
+    <mc:Choice xmlns:p14="http://schemas.microsoft.com/office/powerpoint/2010/main" Requires="p14">
+      <p:transition spd="slow" p14:dur="2000"/>
+    </mc:Choice>
+    <mc:Fallback>
+      <p:transition xmlns:p14="http://schemas.microsoft.com/office/powerpoint/2010/main" spd="slow"/>
+    </mc:Fallback>
+  </mc:AlternateContent>
+</p:sld>
+</file>
+
 <file path=ppt/slides/slide2.xml><?xml version="1.0" encoding="utf-8"?>
 <p:sld xmlns:a="http://schemas.openxmlformats.org/drawingml/2006/main" xmlns:r="http://schemas.openxmlformats.org/officeDocument/2006/relationships" xmlns:p="http://schemas.openxmlformats.org/presentationml/2006/main">
   <p:cSld>
@@ -13165,6 +14240,882 @@
 </p:sld>
 </file>
 
+<file path=ppt/slides/slide20.xml><?xml version="1.0" encoding="utf-8"?>
+<p:sld xmlns:a="http://schemas.openxmlformats.org/drawingml/2006/main" xmlns:r="http://schemas.openxmlformats.org/officeDocument/2006/relationships" xmlns:p="http://schemas.openxmlformats.org/presentationml/2006/main">
+  <p:cSld>
+    <p:spTree>
+      <p:nvGrpSpPr>
+        <p:cNvPr id="1" name=""/>
+        <p:cNvGrpSpPr/>
+        <p:nvPr/>
+      </p:nvGrpSpPr>
+      <p:grpSpPr>
+        <a:xfrm>
+          <a:off x="0" y="0"/>
+          <a:ext cx="0" cy="0"/>
+          <a:chOff x="0" y="0"/>
+          <a:chExt cx="0" cy="0"/>
+        </a:xfrm>
+      </p:grpSpPr>
+      <p:sp>
+        <p:nvSpPr>
+          <p:cNvPr id="2" name="Title 1"/>
+          <p:cNvSpPr>
+            <a:spLocks noGrp="1"/>
+          </p:cNvSpPr>
+          <p:nvPr>
+            <p:ph type="title"/>
+          </p:nvPr>
+        </p:nvSpPr>
+        <p:spPr/>
+        <p:txBody>
+          <a:bodyPr/>
+          <a:lstStyle/>
+          <a:p>
+            <a:r>
+              <a:rPr lang="en-US" dirty="0" smtClean="0"/>
+              <a:t>View Replies</a:t>
+            </a:r>
+            <a:endParaRPr lang="en-US" dirty="0"/>
+          </a:p>
+        </p:txBody>
+      </p:sp>
+      <p:pic>
+        <p:nvPicPr>
+          <p:cNvPr id="3" name="Picture 2"/>
+          <p:cNvPicPr>
+            <a:picLocks noChangeAspect="1"/>
+          </p:cNvPicPr>
+          <p:nvPr/>
+        </p:nvPicPr>
+        <p:blipFill>
+          <a:blip r:embed="rId2"/>
+          <a:stretch>
+            <a:fillRect/>
+          </a:stretch>
+        </p:blipFill>
+        <p:spPr>
+          <a:xfrm>
+            <a:off x="508001" y="1269694"/>
+            <a:ext cx="6614966" cy="5588305"/>
+          </a:xfrm>
+          <a:prstGeom prst="rect">
+            <a:avLst/>
+          </a:prstGeom>
+        </p:spPr>
+      </p:pic>
+    </p:spTree>
+    <p:extLst>
+      <p:ext uri="{BB962C8B-B14F-4D97-AF65-F5344CB8AC3E}">
+        <p14:creationId xmlns:p14="http://schemas.microsoft.com/office/powerpoint/2010/main" val="2300375014"/>
+      </p:ext>
+    </p:extLst>
+  </p:cSld>
+  <p:clrMapOvr>
+    <a:masterClrMapping/>
+  </p:clrMapOvr>
+  <mc:AlternateContent xmlns:mc="http://schemas.openxmlformats.org/markup-compatibility/2006">
+    <mc:Choice xmlns:p14="http://schemas.microsoft.com/office/powerpoint/2010/main" Requires="p14">
+      <p:transition spd="slow" p14:dur="2000"/>
+    </mc:Choice>
+    <mc:Fallback>
+      <p:transition xmlns:p14="http://schemas.microsoft.com/office/powerpoint/2010/main" spd="slow"/>
+    </mc:Fallback>
+  </mc:AlternateContent>
+</p:sld>
+</file>
+
+<file path=ppt/slides/slide21.xml><?xml version="1.0" encoding="utf-8"?>
+<p:sld xmlns:a="http://schemas.openxmlformats.org/drawingml/2006/main" xmlns:r="http://schemas.openxmlformats.org/officeDocument/2006/relationships" xmlns:p="http://schemas.openxmlformats.org/presentationml/2006/main">
+  <p:cSld>
+    <p:spTree>
+      <p:nvGrpSpPr>
+        <p:cNvPr id="1" name=""/>
+        <p:cNvGrpSpPr/>
+        <p:nvPr/>
+      </p:nvGrpSpPr>
+      <p:grpSpPr>
+        <a:xfrm>
+          <a:off x="0" y="0"/>
+          <a:ext cx="0" cy="0"/>
+          <a:chOff x="0" y="0"/>
+          <a:chExt cx="0" cy="0"/>
+        </a:xfrm>
+      </p:grpSpPr>
+      <p:sp>
+        <p:nvSpPr>
+          <p:cNvPr id="2" name="Title 1"/>
+          <p:cNvSpPr>
+            <a:spLocks noGrp="1"/>
+          </p:cNvSpPr>
+          <p:nvPr>
+            <p:ph type="title"/>
+          </p:nvPr>
+        </p:nvSpPr>
+        <p:spPr/>
+        <p:txBody>
+          <a:bodyPr/>
+          <a:lstStyle/>
+          <a:p>
+            <a:r>
+              <a:rPr lang="en-US" dirty="0" smtClean="0"/>
+              <a:t>View Replies</a:t>
+            </a:r>
+            <a:endParaRPr lang="en-US" dirty="0"/>
+          </a:p>
+        </p:txBody>
+      </p:sp>
+      <p:pic>
+        <p:nvPicPr>
+          <p:cNvPr id="4" name="Picture 3"/>
+          <p:cNvPicPr>
+            <a:picLocks noChangeAspect="1"/>
+          </p:cNvPicPr>
+          <p:nvPr/>
+        </p:nvPicPr>
+        <p:blipFill>
+          <a:blip r:embed="rId2"/>
+          <a:stretch>
+            <a:fillRect/>
+          </a:stretch>
+        </p:blipFill>
+        <p:spPr>
+          <a:xfrm>
+            <a:off x="1689100" y="1169140"/>
+            <a:ext cx="4592841" cy="5465766"/>
+          </a:xfrm>
+          <a:prstGeom prst="rect">
+            <a:avLst/>
+          </a:prstGeom>
+        </p:spPr>
+      </p:pic>
+    </p:spTree>
+    <p:extLst>
+      <p:ext uri="{BB962C8B-B14F-4D97-AF65-F5344CB8AC3E}">
+        <p14:creationId xmlns:p14="http://schemas.microsoft.com/office/powerpoint/2010/main" val="2651831471"/>
+      </p:ext>
+    </p:extLst>
+  </p:cSld>
+  <p:clrMapOvr>
+    <a:masterClrMapping/>
+  </p:clrMapOvr>
+  <mc:AlternateContent xmlns:mc="http://schemas.openxmlformats.org/markup-compatibility/2006">
+    <mc:Choice xmlns:p14="http://schemas.microsoft.com/office/powerpoint/2010/main" Requires="p14">
+      <p:transition spd="slow" p14:dur="2000"/>
+    </mc:Choice>
+    <mc:Fallback>
+      <p:transition xmlns:p14="http://schemas.microsoft.com/office/powerpoint/2010/main" spd="slow"/>
+    </mc:Fallback>
+  </mc:AlternateContent>
+</p:sld>
+</file>
+
+<file path=ppt/slides/slide22.xml><?xml version="1.0" encoding="utf-8"?>
+<p:sld xmlns:a="http://schemas.openxmlformats.org/drawingml/2006/main" xmlns:r="http://schemas.openxmlformats.org/officeDocument/2006/relationships" xmlns:p="http://schemas.openxmlformats.org/presentationml/2006/main">
+  <p:cSld>
+    <p:spTree>
+      <p:nvGrpSpPr>
+        <p:cNvPr id="1" name=""/>
+        <p:cNvGrpSpPr/>
+        <p:nvPr/>
+      </p:nvGrpSpPr>
+      <p:grpSpPr>
+        <a:xfrm>
+          <a:off x="0" y="0"/>
+          <a:ext cx="0" cy="0"/>
+          <a:chOff x="0" y="0"/>
+          <a:chExt cx="0" cy="0"/>
+        </a:xfrm>
+      </p:grpSpPr>
+      <p:sp>
+        <p:nvSpPr>
+          <p:cNvPr id="2" name="Title 1"/>
+          <p:cNvSpPr>
+            <a:spLocks noGrp="1"/>
+          </p:cNvSpPr>
+          <p:nvPr>
+            <p:ph type="title"/>
+          </p:nvPr>
+        </p:nvSpPr>
+        <p:spPr/>
+        <p:txBody>
+          <a:bodyPr/>
+          <a:lstStyle/>
+          <a:p>
+            <a:r>
+              <a:rPr lang="en-US" dirty="0" smtClean="0"/>
+              <a:t>View Replies</a:t>
+            </a:r>
+            <a:endParaRPr lang="en-US" dirty="0"/>
+          </a:p>
+        </p:txBody>
+      </p:sp>
+      <p:pic>
+        <p:nvPicPr>
+          <p:cNvPr id="3" name="Picture 2"/>
+          <p:cNvPicPr>
+            <a:picLocks noChangeAspect="1"/>
+          </p:cNvPicPr>
+          <p:nvPr/>
+        </p:nvPicPr>
+        <p:blipFill>
+          <a:blip r:embed="rId2"/>
+          <a:stretch>
+            <a:fillRect/>
+          </a:stretch>
+        </p:blipFill>
+        <p:spPr>
+          <a:xfrm>
+            <a:off x="1108178" y="1184115"/>
+            <a:ext cx="3002777" cy="5673885"/>
+          </a:xfrm>
+          <a:prstGeom prst="rect">
+            <a:avLst/>
+          </a:prstGeom>
+        </p:spPr>
+      </p:pic>
+      <p:sp>
+        <p:nvSpPr>
+          <p:cNvPr id="4" name="TextBox 3"/>
+          <p:cNvSpPr txBox="1"/>
+          <p:nvPr/>
+        </p:nvSpPr>
+        <p:spPr>
+          <a:xfrm>
+            <a:off x="4290944" y="3397896"/>
+            <a:ext cx="4354640" cy="646331"/>
+          </a:xfrm>
+          <a:prstGeom prst="rect">
+            <a:avLst/>
+          </a:prstGeom>
+          <a:noFill/>
+        </p:spPr>
+        <p:txBody>
+          <a:bodyPr wrap="none" rtlCol="0">
+            <a:spAutoFit/>
+          </a:bodyPr>
+          <a:lstStyle/>
+          <a:p>
+            <a:r>
+              <a:rPr lang="en-US" dirty="0" smtClean="0"/>
+              <a:t>Displays your new reply to the question </a:t>
+            </a:r>
+          </a:p>
+          <a:p>
+            <a:r>
+              <a:rPr lang="en-US" dirty="0" smtClean="0"/>
+              <a:t>Or answer</a:t>
+            </a:r>
+            <a:endParaRPr lang="en-US" dirty="0"/>
+          </a:p>
+        </p:txBody>
+      </p:sp>
+    </p:spTree>
+    <p:extLst>
+      <p:ext uri="{BB962C8B-B14F-4D97-AF65-F5344CB8AC3E}">
+        <p14:creationId xmlns:p14="http://schemas.microsoft.com/office/powerpoint/2010/main" val="1203470524"/>
+      </p:ext>
+    </p:extLst>
+  </p:cSld>
+  <p:clrMapOvr>
+    <a:masterClrMapping/>
+  </p:clrMapOvr>
+  <mc:AlternateContent xmlns:mc="http://schemas.openxmlformats.org/markup-compatibility/2006">
+    <mc:Choice xmlns:p14="http://schemas.microsoft.com/office/powerpoint/2010/main" Requires="p14">
+      <p:transition spd="slow" p14:dur="2000"/>
+    </mc:Choice>
+    <mc:Fallback>
+      <p:transition xmlns:p14="http://schemas.microsoft.com/office/powerpoint/2010/main" spd="slow"/>
+    </mc:Fallback>
+  </mc:AlternateContent>
+</p:sld>
+</file>
+
+<file path=ppt/slides/slide23.xml><?xml version="1.0" encoding="utf-8"?>
+<p:sld xmlns:a="http://schemas.openxmlformats.org/drawingml/2006/main" xmlns:r="http://schemas.openxmlformats.org/officeDocument/2006/relationships" xmlns:p="http://schemas.openxmlformats.org/presentationml/2006/main">
+  <p:cSld>
+    <p:spTree>
+      <p:nvGrpSpPr>
+        <p:cNvPr id="1" name=""/>
+        <p:cNvGrpSpPr/>
+        <p:nvPr/>
+      </p:nvGrpSpPr>
+      <p:grpSpPr>
+        <a:xfrm>
+          <a:off x="0" y="0"/>
+          <a:ext cx="0" cy="0"/>
+          <a:chOff x="0" y="0"/>
+          <a:chExt cx="0" cy="0"/>
+        </a:xfrm>
+      </p:grpSpPr>
+      <p:sp>
+        <p:nvSpPr>
+          <p:cNvPr id="2" name="Title 1"/>
+          <p:cNvSpPr>
+            <a:spLocks noGrp="1"/>
+          </p:cNvSpPr>
+          <p:nvPr>
+            <p:ph type="title"/>
+          </p:nvPr>
+        </p:nvSpPr>
+        <p:spPr/>
+        <p:txBody>
+          <a:bodyPr/>
+          <a:lstStyle/>
+          <a:p>
+            <a:r>
+              <a:rPr lang="en-US" dirty="0" smtClean="0"/>
+              <a:t>Basic Actions on the Question Page</a:t>
+            </a:r>
+            <a:endParaRPr lang="en-US" dirty="0"/>
+          </a:p>
+        </p:txBody>
+      </p:sp>
+      <p:pic>
+        <p:nvPicPr>
+          <p:cNvPr id="3" name="Picture 2"/>
+          <p:cNvPicPr>
+            <a:picLocks noChangeAspect="1"/>
+          </p:cNvPicPr>
+          <p:nvPr/>
+        </p:nvPicPr>
+        <p:blipFill>
+          <a:blip r:embed="rId2"/>
+          <a:stretch>
+            <a:fillRect/>
+          </a:stretch>
+        </p:blipFill>
+        <p:spPr>
+          <a:xfrm>
+            <a:off x="1407430" y="1609476"/>
+            <a:ext cx="7414750" cy="4722959"/>
+          </a:xfrm>
+          <a:prstGeom prst="rect">
+            <a:avLst/>
+          </a:prstGeom>
+        </p:spPr>
+      </p:pic>
+    </p:spTree>
+    <p:extLst>
+      <p:ext uri="{BB962C8B-B14F-4D97-AF65-F5344CB8AC3E}">
+        <p14:creationId xmlns:p14="http://schemas.microsoft.com/office/powerpoint/2010/main" val="469502711"/>
+      </p:ext>
+    </p:extLst>
+  </p:cSld>
+  <p:clrMapOvr>
+    <a:masterClrMapping/>
+  </p:clrMapOvr>
+  <mc:AlternateContent xmlns:mc="http://schemas.openxmlformats.org/markup-compatibility/2006">
+    <mc:Choice xmlns:p14="http://schemas.microsoft.com/office/powerpoint/2010/main" Requires="p14">
+      <p:transition spd="slow" p14:dur="2000"/>
+    </mc:Choice>
+    <mc:Fallback>
+      <p:transition xmlns:p14="http://schemas.microsoft.com/office/powerpoint/2010/main" spd="slow"/>
+    </mc:Fallback>
+  </mc:AlternateContent>
+</p:sld>
+</file>
+
+<file path=ppt/slides/slide24.xml><?xml version="1.0" encoding="utf-8"?>
+<p:sld xmlns:a="http://schemas.openxmlformats.org/drawingml/2006/main" xmlns:r="http://schemas.openxmlformats.org/officeDocument/2006/relationships" xmlns:p="http://schemas.openxmlformats.org/presentationml/2006/main">
+  <p:cSld>
+    <p:spTree>
+      <p:nvGrpSpPr>
+        <p:cNvPr id="1" name=""/>
+        <p:cNvGrpSpPr/>
+        <p:nvPr/>
+      </p:nvGrpSpPr>
+      <p:grpSpPr>
+        <a:xfrm>
+          <a:off x="0" y="0"/>
+          <a:ext cx="0" cy="0"/>
+          <a:chOff x="0" y="0"/>
+          <a:chExt cx="0" cy="0"/>
+        </a:xfrm>
+      </p:grpSpPr>
+      <p:sp>
+        <p:nvSpPr>
+          <p:cNvPr id="2" name="Title 1"/>
+          <p:cNvSpPr>
+            <a:spLocks noGrp="1"/>
+          </p:cNvSpPr>
+          <p:nvPr>
+            <p:ph type="title"/>
+          </p:nvPr>
+        </p:nvSpPr>
+        <p:spPr/>
+        <p:txBody>
+          <a:bodyPr/>
+          <a:lstStyle/>
+          <a:p>
+            <a:r>
+              <a:rPr lang="en-US" dirty="0" smtClean="0"/>
+              <a:t>Go to My Profile</a:t>
+            </a:r>
+            <a:endParaRPr lang="en-US" dirty="0"/>
+          </a:p>
+        </p:txBody>
+      </p:sp>
+      <p:pic>
+        <p:nvPicPr>
+          <p:cNvPr id="4" name="Picture 3"/>
+          <p:cNvPicPr>
+            <a:picLocks noChangeAspect="1"/>
+          </p:cNvPicPr>
+          <p:nvPr/>
+        </p:nvPicPr>
+        <p:blipFill>
+          <a:blip r:embed="rId2"/>
+          <a:stretch>
+            <a:fillRect/>
+          </a:stretch>
+        </p:blipFill>
+        <p:spPr>
+          <a:xfrm>
+            <a:off x="1608632" y="1600200"/>
+            <a:ext cx="2114869" cy="5257800"/>
+          </a:xfrm>
+          <a:prstGeom prst="rect">
+            <a:avLst/>
+          </a:prstGeom>
+        </p:spPr>
+      </p:pic>
+    </p:spTree>
+    <p:extLst>
+      <p:ext uri="{BB962C8B-B14F-4D97-AF65-F5344CB8AC3E}">
+        <p14:creationId xmlns:p14="http://schemas.microsoft.com/office/powerpoint/2010/main" val="554340658"/>
+      </p:ext>
+    </p:extLst>
+  </p:cSld>
+  <p:clrMapOvr>
+    <a:masterClrMapping/>
+  </p:clrMapOvr>
+</p:sld>
+</file>
+
+<file path=ppt/slides/slide25.xml><?xml version="1.0" encoding="utf-8"?>
+<p:sld xmlns:a="http://schemas.openxmlformats.org/drawingml/2006/main" xmlns:r="http://schemas.openxmlformats.org/officeDocument/2006/relationships" xmlns:p="http://schemas.openxmlformats.org/presentationml/2006/main">
+  <p:cSld>
+    <p:spTree>
+      <p:nvGrpSpPr>
+        <p:cNvPr id="1" name=""/>
+        <p:cNvGrpSpPr/>
+        <p:nvPr/>
+      </p:nvGrpSpPr>
+      <p:grpSpPr>
+        <a:xfrm>
+          <a:off x="0" y="0"/>
+          <a:ext cx="0" cy="0"/>
+          <a:chOff x="0" y="0"/>
+          <a:chExt cx="0" cy="0"/>
+        </a:xfrm>
+      </p:grpSpPr>
+      <p:sp>
+        <p:nvSpPr>
+          <p:cNvPr id="2" name="Title 1"/>
+          <p:cNvSpPr>
+            <a:spLocks noGrp="1"/>
+          </p:cNvSpPr>
+          <p:nvPr>
+            <p:ph type="title"/>
+          </p:nvPr>
+        </p:nvSpPr>
+        <p:spPr/>
+        <p:txBody>
+          <a:bodyPr/>
+          <a:lstStyle/>
+          <a:p>
+            <a:r>
+              <a:rPr lang="en-US" dirty="0" smtClean="0"/>
+              <a:t>My Profile</a:t>
+            </a:r>
+            <a:endParaRPr lang="en-US" dirty="0"/>
+          </a:p>
+        </p:txBody>
+      </p:sp>
+      <p:pic>
+        <p:nvPicPr>
+          <p:cNvPr id="3" name="Picture 2"/>
+          <p:cNvPicPr>
+            <a:picLocks noChangeAspect="1"/>
+          </p:cNvPicPr>
+          <p:nvPr/>
+        </p:nvPicPr>
+        <p:blipFill>
+          <a:blip r:embed="rId2"/>
+          <a:stretch>
+            <a:fillRect/>
+          </a:stretch>
+        </p:blipFill>
+        <p:spPr>
+          <a:xfrm>
+            <a:off x="1159671" y="1342784"/>
+            <a:ext cx="2766108" cy="5257800"/>
+          </a:xfrm>
+          <a:prstGeom prst="rect">
+            <a:avLst/>
+          </a:prstGeom>
+        </p:spPr>
+      </p:pic>
+      <p:sp>
+        <p:nvSpPr>
+          <p:cNvPr id="5" name="TextBox 4"/>
+          <p:cNvSpPr txBox="1"/>
+          <p:nvPr/>
+        </p:nvSpPr>
+        <p:spPr>
+          <a:xfrm>
+            <a:off x="4955605" y="2333908"/>
+            <a:ext cx="2854229" cy="369332"/>
+          </a:xfrm>
+          <a:prstGeom prst="rect">
+            <a:avLst/>
+          </a:prstGeom>
+          <a:noFill/>
+        </p:spPr>
+        <p:txBody>
+          <a:bodyPr wrap="none" rtlCol="0">
+            <a:spAutoFit/>
+          </a:bodyPr>
+          <a:lstStyle/>
+          <a:p>
+            <a:r>
+              <a:rPr lang="en-US" dirty="0" smtClean="0"/>
+              <a:t>Default my profile screen</a:t>
+            </a:r>
+            <a:endParaRPr lang="en-US" dirty="0"/>
+          </a:p>
+        </p:txBody>
+      </p:sp>
+    </p:spTree>
+    <p:extLst>
+      <p:ext uri="{BB962C8B-B14F-4D97-AF65-F5344CB8AC3E}">
+        <p14:creationId xmlns:p14="http://schemas.microsoft.com/office/powerpoint/2010/main" val="2359403794"/>
+      </p:ext>
+    </p:extLst>
+  </p:cSld>
+  <p:clrMapOvr>
+    <a:masterClrMapping/>
+  </p:clrMapOvr>
+</p:sld>
+</file>
+
+<file path=ppt/slides/slide26.xml><?xml version="1.0" encoding="utf-8"?>
+<p:sld xmlns:a="http://schemas.openxmlformats.org/drawingml/2006/main" xmlns:r="http://schemas.openxmlformats.org/officeDocument/2006/relationships" xmlns:p="http://schemas.openxmlformats.org/presentationml/2006/main">
+  <p:cSld>
+    <p:spTree>
+      <p:nvGrpSpPr>
+        <p:cNvPr id="1" name=""/>
+        <p:cNvGrpSpPr/>
+        <p:nvPr/>
+      </p:nvGrpSpPr>
+      <p:grpSpPr>
+        <a:xfrm>
+          <a:off x="0" y="0"/>
+          <a:ext cx="0" cy="0"/>
+          <a:chOff x="0" y="0"/>
+          <a:chExt cx="0" cy="0"/>
+        </a:xfrm>
+      </p:grpSpPr>
+      <p:sp>
+        <p:nvSpPr>
+          <p:cNvPr id="2" name="Title 1"/>
+          <p:cNvSpPr>
+            <a:spLocks noGrp="1"/>
+          </p:cNvSpPr>
+          <p:nvPr>
+            <p:ph type="title"/>
+          </p:nvPr>
+        </p:nvSpPr>
+        <p:spPr/>
+        <p:txBody>
+          <a:bodyPr/>
+          <a:lstStyle/>
+          <a:p>
+            <a:r>
+              <a:rPr lang="en-US" dirty="0" smtClean="0"/>
+              <a:t>To My </a:t>
+            </a:r>
+            <a:r>
+              <a:rPr lang="en-US" dirty="0" err="1" smtClean="0"/>
+              <a:t>favourites</a:t>
+            </a:r>
+            <a:endParaRPr lang="en-US" dirty="0"/>
+          </a:p>
+        </p:txBody>
+      </p:sp>
+      <p:pic>
+        <p:nvPicPr>
+          <p:cNvPr id="4" name="Picture 3"/>
+          <p:cNvPicPr>
+            <a:picLocks noChangeAspect="1"/>
+          </p:cNvPicPr>
+          <p:nvPr/>
+        </p:nvPicPr>
+        <p:blipFill>
+          <a:blip r:embed="rId2"/>
+          <a:stretch>
+            <a:fillRect/>
+          </a:stretch>
+        </p:blipFill>
+        <p:spPr>
+          <a:xfrm>
+            <a:off x="0" y="1210386"/>
+            <a:ext cx="7552060" cy="5621503"/>
+          </a:xfrm>
+          <a:prstGeom prst="rect">
+            <a:avLst/>
+          </a:prstGeom>
+        </p:spPr>
+      </p:pic>
+    </p:spTree>
+    <p:extLst>
+      <p:ext uri="{BB962C8B-B14F-4D97-AF65-F5344CB8AC3E}">
+        <p14:creationId xmlns:p14="http://schemas.microsoft.com/office/powerpoint/2010/main" val="4161814350"/>
+      </p:ext>
+    </p:extLst>
+  </p:cSld>
+  <p:clrMapOvr>
+    <a:masterClrMapping/>
+  </p:clrMapOvr>
+</p:sld>
+</file>
+
+<file path=ppt/slides/slide27.xml><?xml version="1.0" encoding="utf-8"?>
+<p:sld xmlns:a="http://schemas.openxmlformats.org/drawingml/2006/main" xmlns:r="http://schemas.openxmlformats.org/officeDocument/2006/relationships" xmlns:p="http://schemas.openxmlformats.org/presentationml/2006/main">
+  <p:cSld>
+    <p:spTree>
+      <p:nvGrpSpPr>
+        <p:cNvPr id="1" name=""/>
+        <p:cNvGrpSpPr/>
+        <p:nvPr/>
+      </p:nvGrpSpPr>
+      <p:grpSpPr>
+        <a:xfrm>
+          <a:off x="0" y="0"/>
+          <a:ext cx="0" cy="0"/>
+          <a:chOff x="0" y="0"/>
+          <a:chExt cx="0" cy="0"/>
+        </a:xfrm>
+      </p:grpSpPr>
+      <p:sp>
+        <p:nvSpPr>
+          <p:cNvPr id="2" name="Title 1"/>
+          <p:cNvSpPr>
+            <a:spLocks noGrp="1"/>
+          </p:cNvSpPr>
+          <p:nvPr>
+            <p:ph type="title"/>
+          </p:nvPr>
+        </p:nvSpPr>
+        <p:spPr/>
+        <p:txBody>
+          <a:bodyPr/>
+          <a:lstStyle/>
+          <a:p>
+            <a:r>
+              <a:rPr lang="en-US" dirty="0" smtClean="0"/>
+              <a:t>My </a:t>
+            </a:r>
+            <a:r>
+              <a:rPr lang="en-US" dirty="0" err="1" smtClean="0"/>
+              <a:t>favourites</a:t>
+            </a:r>
+            <a:endParaRPr lang="en-US" dirty="0"/>
+          </a:p>
+        </p:txBody>
+      </p:sp>
+      <p:pic>
+        <p:nvPicPr>
+          <p:cNvPr id="3" name="Picture 2"/>
+          <p:cNvPicPr>
+            <a:picLocks noChangeAspect="1"/>
+          </p:cNvPicPr>
+          <p:nvPr/>
+        </p:nvPicPr>
+        <p:blipFill>
+          <a:blip r:embed="rId2"/>
+          <a:stretch>
+            <a:fillRect/>
+          </a:stretch>
+        </p:blipFill>
+        <p:spPr>
+          <a:xfrm>
+            <a:off x="1112643" y="1256979"/>
+            <a:ext cx="2799038" cy="5257800"/>
+          </a:xfrm>
+          <a:prstGeom prst="rect">
+            <a:avLst/>
+          </a:prstGeom>
+        </p:spPr>
+      </p:pic>
+    </p:spTree>
+    <p:extLst>
+      <p:ext uri="{BB962C8B-B14F-4D97-AF65-F5344CB8AC3E}">
+        <p14:creationId xmlns:p14="http://schemas.microsoft.com/office/powerpoint/2010/main" val="272794920"/>
+      </p:ext>
+    </p:extLst>
+  </p:cSld>
+  <p:clrMapOvr>
+    <a:masterClrMapping/>
+  </p:clrMapOvr>
+</p:sld>
+</file>
+
+<file path=ppt/slides/slide28.xml><?xml version="1.0" encoding="utf-8"?>
+<p:sld xmlns:a="http://schemas.openxmlformats.org/drawingml/2006/main" xmlns:r="http://schemas.openxmlformats.org/officeDocument/2006/relationships" xmlns:p="http://schemas.openxmlformats.org/presentationml/2006/main">
+  <p:cSld>
+    <p:spTree>
+      <p:nvGrpSpPr>
+        <p:cNvPr id="1" name=""/>
+        <p:cNvGrpSpPr/>
+        <p:nvPr/>
+      </p:nvGrpSpPr>
+      <p:grpSpPr>
+        <a:xfrm>
+          <a:off x="0" y="0"/>
+          <a:ext cx="0" cy="0"/>
+          <a:chOff x="0" y="0"/>
+          <a:chExt cx="0" cy="0"/>
+        </a:xfrm>
+      </p:grpSpPr>
+      <p:sp>
+        <p:nvSpPr>
+          <p:cNvPr id="2" name="Title 1"/>
+          <p:cNvSpPr>
+            <a:spLocks noGrp="1"/>
+          </p:cNvSpPr>
+          <p:nvPr>
+            <p:ph type="title"/>
+          </p:nvPr>
+        </p:nvSpPr>
+        <p:spPr/>
+        <p:txBody>
+          <a:bodyPr/>
+          <a:lstStyle/>
+          <a:p>
+            <a:r>
+              <a:rPr lang="en-US" dirty="0" smtClean="0"/>
+              <a:t>To My questions</a:t>
+            </a:r>
+            <a:endParaRPr lang="en-US" dirty="0"/>
+          </a:p>
+        </p:txBody>
+      </p:sp>
+      <p:pic>
+        <p:nvPicPr>
+          <p:cNvPr id="4" name="Picture 3"/>
+          <p:cNvPicPr>
+            <a:picLocks noChangeAspect="1"/>
+          </p:cNvPicPr>
+          <p:nvPr/>
+        </p:nvPicPr>
+        <p:blipFill>
+          <a:blip r:embed="rId2"/>
+          <a:stretch>
+            <a:fillRect/>
+          </a:stretch>
+        </p:blipFill>
+        <p:spPr>
+          <a:xfrm>
+            <a:off x="1193801" y="1425214"/>
+            <a:ext cx="4830684" cy="4917954"/>
+          </a:xfrm>
+          <a:prstGeom prst="rect">
+            <a:avLst/>
+          </a:prstGeom>
+        </p:spPr>
+      </p:pic>
+    </p:spTree>
+    <p:extLst>
+      <p:ext uri="{BB962C8B-B14F-4D97-AF65-F5344CB8AC3E}">
+        <p14:creationId xmlns:p14="http://schemas.microsoft.com/office/powerpoint/2010/main" val="1133509680"/>
+      </p:ext>
+    </p:extLst>
+  </p:cSld>
+  <p:clrMapOvr>
+    <a:masterClrMapping/>
+  </p:clrMapOvr>
+</p:sld>
+</file>
+
+<file path=ppt/slides/slide29.xml><?xml version="1.0" encoding="utf-8"?>
+<p:sld xmlns:a="http://schemas.openxmlformats.org/drawingml/2006/main" xmlns:r="http://schemas.openxmlformats.org/officeDocument/2006/relationships" xmlns:p="http://schemas.openxmlformats.org/presentationml/2006/main">
+  <p:cSld>
+    <p:spTree>
+      <p:nvGrpSpPr>
+        <p:cNvPr id="1" name=""/>
+        <p:cNvGrpSpPr/>
+        <p:nvPr/>
+      </p:nvGrpSpPr>
+      <p:grpSpPr>
+        <a:xfrm>
+          <a:off x="0" y="0"/>
+          <a:ext cx="0" cy="0"/>
+          <a:chOff x="0" y="0"/>
+          <a:chExt cx="0" cy="0"/>
+        </a:xfrm>
+      </p:grpSpPr>
+      <p:sp>
+        <p:nvSpPr>
+          <p:cNvPr id="2" name="Title 1"/>
+          <p:cNvSpPr>
+            <a:spLocks noGrp="1"/>
+          </p:cNvSpPr>
+          <p:nvPr>
+            <p:ph type="title"/>
+          </p:nvPr>
+        </p:nvSpPr>
+        <p:spPr/>
+        <p:txBody>
+          <a:bodyPr/>
+          <a:lstStyle/>
+          <a:p>
+            <a:r>
+              <a:rPr lang="en-US" dirty="0" smtClean="0"/>
+              <a:t>My questions</a:t>
+            </a:r>
+            <a:endParaRPr lang="en-US" dirty="0"/>
+          </a:p>
+        </p:txBody>
+      </p:sp>
+      <p:pic>
+        <p:nvPicPr>
+          <p:cNvPr id="3" name="Picture 2"/>
+          <p:cNvPicPr>
+            <a:picLocks noChangeAspect="1"/>
+          </p:cNvPicPr>
+          <p:nvPr/>
+        </p:nvPicPr>
+        <p:blipFill>
+          <a:blip r:embed="rId2"/>
+          <a:stretch>
+            <a:fillRect/>
+          </a:stretch>
+        </p:blipFill>
+        <p:spPr>
+          <a:xfrm>
+            <a:off x="1627556" y="1321403"/>
+            <a:ext cx="2508936" cy="4712864"/>
+          </a:xfrm>
+          <a:prstGeom prst="rect">
+            <a:avLst/>
+          </a:prstGeom>
+        </p:spPr>
+      </p:pic>
+    </p:spTree>
+    <p:extLst>
+      <p:ext uri="{BB962C8B-B14F-4D97-AF65-F5344CB8AC3E}">
+        <p14:creationId xmlns:p14="http://schemas.microsoft.com/office/powerpoint/2010/main" val="271243837"/>
+      </p:ext>
+    </p:extLst>
+  </p:cSld>
+  <p:clrMapOvr>
+    <a:masterClrMapping/>
+  </p:clrMapOvr>
+</p:sld>
+</file>
+
 <file path=ppt/slides/slide3.xml><?xml version="1.0" encoding="utf-8"?>
 <p:sld xmlns:a="http://schemas.openxmlformats.org/drawingml/2006/main" xmlns:r="http://schemas.openxmlformats.org/officeDocument/2006/relationships" xmlns:p="http://schemas.openxmlformats.org/presentationml/2006/main">
   <p:cSld>
@@ -13247,6 +15198,160 @@
       <p:transition xmlns:p14="http://schemas.microsoft.com/office/powerpoint/2010/main" spd="slow"/>
     </mc:Fallback>
   </mc:AlternateContent>
+</p:sld>
+</file>
+
+<file path=ppt/slides/slide30.xml><?xml version="1.0" encoding="utf-8"?>
+<p:sld xmlns:a="http://schemas.openxmlformats.org/drawingml/2006/main" xmlns:r="http://schemas.openxmlformats.org/officeDocument/2006/relationships" xmlns:p="http://schemas.openxmlformats.org/presentationml/2006/main">
+  <p:cSld>
+    <p:spTree>
+      <p:nvGrpSpPr>
+        <p:cNvPr id="1" name=""/>
+        <p:cNvGrpSpPr/>
+        <p:nvPr/>
+      </p:nvGrpSpPr>
+      <p:grpSpPr>
+        <a:xfrm>
+          <a:off x="0" y="0"/>
+          <a:ext cx="0" cy="0"/>
+          <a:chOff x="0" y="0"/>
+          <a:chExt cx="0" cy="0"/>
+        </a:xfrm>
+      </p:grpSpPr>
+      <p:sp>
+        <p:nvSpPr>
+          <p:cNvPr id="2" name="Title 1"/>
+          <p:cNvSpPr>
+            <a:spLocks noGrp="1"/>
+          </p:cNvSpPr>
+          <p:nvPr>
+            <p:ph type="title"/>
+          </p:nvPr>
+        </p:nvSpPr>
+        <p:spPr/>
+        <p:txBody>
+          <a:bodyPr/>
+          <a:lstStyle/>
+          <a:p>
+            <a:r>
+              <a:rPr lang="en-US" dirty="0" smtClean="0"/>
+              <a:t>To My cache</a:t>
+            </a:r>
+            <a:endParaRPr lang="en-US" dirty="0"/>
+          </a:p>
+        </p:txBody>
+      </p:sp>
+      <p:pic>
+        <p:nvPicPr>
+          <p:cNvPr id="4" name="Picture 3"/>
+          <p:cNvPicPr>
+            <a:picLocks noChangeAspect="1"/>
+          </p:cNvPicPr>
+          <p:nvPr/>
+        </p:nvPicPr>
+        <p:blipFill>
+          <a:blip r:embed="rId2"/>
+          <a:stretch>
+            <a:fillRect/>
+          </a:stretch>
+        </p:blipFill>
+        <p:spPr>
+          <a:xfrm>
+            <a:off x="498474" y="1292592"/>
+            <a:ext cx="6042715" cy="4964769"/>
+          </a:xfrm>
+          <a:prstGeom prst="rect">
+            <a:avLst/>
+          </a:prstGeom>
+        </p:spPr>
+      </p:pic>
+    </p:spTree>
+    <p:extLst>
+      <p:ext uri="{BB962C8B-B14F-4D97-AF65-F5344CB8AC3E}">
+        <p14:creationId xmlns:p14="http://schemas.microsoft.com/office/powerpoint/2010/main" val="3458895818"/>
+      </p:ext>
+    </p:extLst>
+  </p:cSld>
+  <p:clrMapOvr>
+    <a:masterClrMapping/>
+  </p:clrMapOvr>
+</p:sld>
+</file>
+
+<file path=ppt/slides/slide31.xml><?xml version="1.0" encoding="utf-8"?>
+<p:sld xmlns:a="http://schemas.openxmlformats.org/drawingml/2006/main" xmlns:r="http://schemas.openxmlformats.org/officeDocument/2006/relationships" xmlns:p="http://schemas.openxmlformats.org/presentationml/2006/main">
+  <p:cSld>
+    <p:spTree>
+      <p:nvGrpSpPr>
+        <p:cNvPr id="1" name=""/>
+        <p:cNvGrpSpPr/>
+        <p:nvPr/>
+      </p:nvGrpSpPr>
+      <p:grpSpPr>
+        <a:xfrm>
+          <a:off x="0" y="0"/>
+          <a:ext cx="0" cy="0"/>
+          <a:chOff x="0" y="0"/>
+          <a:chExt cx="0" cy="0"/>
+        </a:xfrm>
+      </p:grpSpPr>
+      <p:sp>
+        <p:nvSpPr>
+          <p:cNvPr id="2" name="Title 1"/>
+          <p:cNvSpPr>
+            <a:spLocks noGrp="1"/>
+          </p:cNvSpPr>
+          <p:nvPr>
+            <p:ph type="title"/>
+          </p:nvPr>
+        </p:nvSpPr>
+        <p:spPr/>
+        <p:txBody>
+          <a:bodyPr/>
+          <a:lstStyle/>
+          <a:p>
+            <a:r>
+              <a:rPr lang="en-US" dirty="0" smtClean="0"/>
+              <a:t>My cache</a:t>
+            </a:r>
+            <a:endParaRPr lang="en-US" dirty="0"/>
+          </a:p>
+        </p:txBody>
+      </p:sp>
+      <p:pic>
+        <p:nvPicPr>
+          <p:cNvPr id="3" name="Picture 2"/>
+          <p:cNvPicPr>
+            <a:picLocks noChangeAspect="1"/>
+          </p:cNvPicPr>
+          <p:nvPr/>
+        </p:nvPicPr>
+        <p:blipFill>
+          <a:blip r:embed="rId2"/>
+          <a:stretch>
+            <a:fillRect/>
+          </a:stretch>
+        </p:blipFill>
+        <p:spPr>
+          <a:xfrm>
+            <a:off x="803695" y="1252759"/>
+            <a:ext cx="2636838" cy="4953119"/>
+          </a:xfrm>
+          <a:prstGeom prst="rect">
+            <a:avLst/>
+          </a:prstGeom>
+        </p:spPr>
+      </p:pic>
+    </p:spTree>
+    <p:extLst>
+      <p:ext uri="{BB962C8B-B14F-4D97-AF65-F5344CB8AC3E}">
+        <p14:creationId xmlns:p14="http://schemas.microsoft.com/office/powerpoint/2010/main" val="1528931103"/>
+      </p:ext>
+    </p:extLst>
+  </p:cSld>
+  <p:clrMapOvr>
+    <a:masterClrMapping/>
+  </p:clrMapOvr>
 </p:sld>
 </file>
 
@@ -13399,6 +15504,36 @@
           </a:prstGeom>
         </p:spPr>
       </p:pic>
+      <p:sp>
+        <p:nvSpPr>
+          <p:cNvPr id="9" name="TextBox 8"/>
+          <p:cNvSpPr txBox="1"/>
+          <p:nvPr/>
+        </p:nvSpPr>
+        <p:spPr>
+          <a:xfrm>
+            <a:off x="5881568" y="6357230"/>
+            <a:ext cx="2866289" cy="369332"/>
+          </a:xfrm>
+          <a:prstGeom prst="rect">
+            <a:avLst/>
+          </a:prstGeom>
+          <a:noFill/>
+        </p:spPr>
+        <p:txBody>
+          <a:bodyPr wrap="none" rtlCol="0">
+            <a:spAutoFit/>
+          </a:bodyPr>
+          <a:lstStyle/>
+          <a:p>
+            <a:r>
+              <a:rPr lang="en-US" dirty="0" smtClean="0"/>
+              <a:t>Brings up a pop-up menu</a:t>
+            </a:r>
+            <a:endParaRPr lang="en-US" dirty="0"/>
+          </a:p>
+        </p:txBody>
+      </p:sp>
     </p:spTree>
     <p:extLst>
       <p:ext uri="{BB962C8B-B14F-4D97-AF65-F5344CB8AC3E}">
@@ -13545,10 +15680,276 @@
           </a:p>
         </p:txBody>
       </p:sp>
+      <p:pic>
+        <p:nvPicPr>
+          <p:cNvPr id="3" name="Picture 2"/>
+          <p:cNvPicPr>
+            <a:picLocks noChangeAspect="1"/>
+          </p:cNvPicPr>
+          <p:nvPr/>
+        </p:nvPicPr>
+        <p:blipFill>
+          <a:blip r:embed="rId2"/>
+          <a:stretch>
+            <a:fillRect/>
+          </a:stretch>
+        </p:blipFill>
+        <p:spPr>
+          <a:xfrm>
+            <a:off x="498474" y="1297278"/>
+            <a:ext cx="6878080" cy="5326759"/>
+          </a:xfrm>
+          <a:prstGeom prst="rect">
+            <a:avLst/>
+          </a:prstGeom>
+        </p:spPr>
+      </p:pic>
     </p:spTree>
     <p:extLst>
       <p:ext uri="{BB962C8B-B14F-4D97-AF65-F5344CB8AC3E}">
         <p14:creationId xmlns:p14="http://schemas.microsoft.com/office/powerpoint/2010/main" val="2590141318"/>
+      </p:ext>
+    </p:extLst>
+  </p:cSld>
+  <p:clrMapOvr>
+    <a:masterClrMapping/>
+  </p:clrMapOvr>
+  <mc:AlternateContent xmlns:mc="http://schemas.openxmlformats.org/markup-compatibility/2006">
+    <mc:Choice xmlns:p14="http://schemas.microsoft.com/office/powerpoint/2010/main" Requires="p14">
+      <p:transition spd="slow" p14:dur="2000"/>
+    </mc:Choice>
+    <mc:Fallback>
+      <p:transition xmlns:p14="http://schemas.microsoft.com/office/powerpoint/2010/main" spd="slow"/>
+    </mc:Fallback>
+  </mc:AlternateContent>
+</p:sld>
+</file>
+
+<file path=ppt/slides/slide8.xml><?xml version="1.0" encoding="utf-8"?>
+<p:sld xmlns:a="http://schemas.openxmlformats.org/drawingml/2006/main" xmlns:r="http://schemas.openxmlformats.org/officeDocument/2006/relationships" xmlns:p="http://schemas.openxmlformats.org/presentationml/2006/main">
+  <p:cSld>
+    <p:spTree>
+      <p:nvGrpSpPr>
+        <p:cNvPr id="1" name=""/>
+        <p:cNvGrpSpPr/>
+        <p:nvPr/>
+      </p:nvGrpSpPr>
+      <p:grpSpPr>
+        <a:xfrm>
+          <a:off x="0" y="0"/>
+          <a:ext cx="0" cy="0"/>
+          <a:chOff x="0" y="0"/>
+          <a:chExt cx="0" cy="0"/>
+        </a:xfrm>
+      </p:grpSpPr>
+      <p:sp>
+        <p:nvSpPr>
+          <p:cNvPr id="2" name="Title 1"/>
+          <p:cNvSpPr>
+            <a:spLocks noGrp="1"/>
+          </p:cNvSpPr>
+          <p:nvPr>
+            <p:ph type="title"/>
+          </p:nvPr>
+        </p:nvSpPr>
+        <p:spPr/>
+        <p:txBody>
+          <a:bodyPr/>
+          <a:lstStyle/>
+          <a:p>
+            <a:r>
+              <a:rPr lang="en-US" dirty="0" smtClean="0"/>
+              <a:t>Asking a Question</a:t>
+            </a:r>
+            <a:endParaRPr lang="en-US" dirty="0"/>
+          </a:p>
+        </p:txBody>
+      </p:sp>
+      <p:pic>
+        <p:nvPicPr>
+          <p:cNvPr id="3" name="Picture 2"/>
+          <p:cNvPicPr>
+            <a:picLocks noChangeAspect="1"/>
+          </p:cNvPicPr>
+          <p:nvPr/>
+        </p:nvPicPr>
+        <p:blipFill>
+          <a:blip r:embed="rId2"/>
+          <a:stretch>
+            <a:fillRect/>
+          </a:stretch>
+        </p:blipFill>
+        <p:spPr>
+          <a:xfrm>
+            <a:off x="800948" y="1170834"/>
+            <a:ext cx="2991996" cy="5687166"/>
+          </a:xfrm>
+          <a:prstGeom prst="rect">
+            <a:avLst/>
+          </a:prstGeom>
+        </p:spPr>
+      </p:pic>
+      <p:sp>
+        <p:nvSpPr>
+          <p:cNvPr id="4" name="TextBox 3"/>
+          <p:cNvSpPr txBox="1"/>
+          <p:nvPr/>
+        </p:nvSpPr>
+        <p:spPr>
+          <a:xfrm>
+            <a:off x="3993451" y="2567931"/>
+            <a:ext cx="4853500" cy="646331"/>
+          </a:xfrm>
+          <a:prstGeom prst="rect">
+            <a:avLst/>
+          </a:prstGeom>
+          <a:noFill/>
+        </p:spPr>
+        <p:txBody>
+          <a:bodyPr wrap="none" rtlCol="0">
+            <a:spAutoFit/>
+          </a:bodyPr>
+          <a:lstStyle/>
+          <a:p>
+            <a:r>
+              <a:rPr lang="en-US" dirty="0" smtClean="0"/>
+              <a:t>If your photo that you’ve taken or tried to </a:t>
+            </a:r>
+          </a:p>
+          <a:p>
+            <a:r>
+              <a:rPr lang="en-US" dirty="0" smtClean="0"/>
+              <a:t>Add is &gt;64kB then, this message will appear</a:t>
+            </a:r>
+            <a:endParaRPr lang="en-US" dirty="0"/>
+          </a:p>
+        </p:txBody>
+      </p:sp>
+    </p:spTree>
+    <p:extLst>
+      <p:ext uri="{BB962C8B-B14F-4D97-AF65-F5344CB8AC3E}">
+        <p14:creationId xmlns:p14="http://schemas.microsoft.com/office/powerpoint/2010/main" val="1706594509"/>
+      </p:ext>
+    </p:extLst>
+  </p:cSld>
+  <p:clrMapOvr>
+    <a:masterClrMapping/>
+  </p:clrMapOvr>
+  <mc:AlternateContent xmlns:mc="http://schemas.openxmlformats.org/markup-compatibility/2006">
+    <mc:Choice xmlns:p14="http://schemas.microsoft.com/office/powerpoint/2010/main" Requires="p14">
+      <p:transition spd="slow" p14:dur="2000"/>
+    </mc:Choice>
+    <mc:Fallback>
+      <p:transition xmlns:p14="http://schemas.microsoft.com/office/powerpoint/2010/main" spd="slow"/>
+    </mc:Fallback>
+  </mc:AlternateContent>
+</p:sld>
+</file>
+
+<file path=ppt/slides/slide9.xml><?xml version="1.0" encoding="utf-8"?>
+<p:sld xmlns:a="http://schemas.openxmlformats.org/drawingml/2006/main" xmlns:r="http://schemas.openxmlformats.org/officeDocument/2006/relationships" xmlns:p="http://schemas.openxmlformats.org/presentationml/2006/main">
+  <p:cSld>
+    <p:spTree>
+      <p:nvGrpSpPr>
+        <p:cNvPr id="1" name=""/>
+        <p:cNvGrpSpPr/>
+        <p:nvPr/>
+      </p:nvGrpSpPr>
+      <p:grpSpPr>
+        <a:xfrm>
+          <a:off x="0" y="0"/>
+          <a:ext cx="0" cy="0"/>
+          <a:chOff x="0" y="0"/>
+          <a:chExt cx="0" cy="0"/>
+        </a:xfrm>
+      </p:grpSpPr>
+      <p:sp>
+        <p:nvSpPr>
+          <p:cNvPr id="2" name="Title 1"/>
+          <p:cNvSpPr>
+            <a:spLocks noGrp="1"/>
+          </p:cNvSpPr>
+          <p:nvPr>
+            <p:ph type="title"/>
+          </p:nvPr>
+        </p:nvSpPr>
+        <p:spPr/>
+        <p:txBody>
+          <a:bodyPr/>
+          <a:lstStyle/>
+          <a:p>
+            <a:r>
+              <a:rPr lang="en-US" dirty="0" smtClean="0"/>
+              <a:t>Asking a Question</a:t>
+            </a:r>
+            <a:endParaRPr lang="en-US" dirty="0"/>
+          </a:p>
+        </p:txBody>
+      </p:sp>
+      <p:pic>
+        <p:nvPicPr>
+          <p:cNvPr id="3" name="Picture 2"/>
+          <p:cNvPicPr>
+            <a:picLocks noChangeAspect="1"/>
+          </p:cNvPicPr>
+          <p:nvPr/>
+        </p:nvPicPr>
+        <p:blipFill>
+          <a:blip r:embed="rId2"/>
+          <a:stretch>
+            <a:fillRect/>
+          </a:stretch>
+        </p:blipFill>
+        <p:spPr>
+          <a:xfrm>
+            <a:off x="1018165" y="1297874"/>
+            <a:ext cx="2925160" cy="5560125"/>
+          </a:xfrm>
+          <a:prstGeom prst="rect">
+            <a:avLst/>
+          </a:prstGeom>
+        </p:spPr>
+      </p:pic>
+      <p:sp>
+        <p:nvSpPr>
+          <p:cNvPr id="4" name="TextBox 3"/>
+          <p:cNvSpPr txBox="1"/>
+          <p:nvPr/>
+        </p:nvSpPr>
+        <p:spPr>
+          <a:xfrm>
+            <a:off x="4268324" y="3236620"/>
+            <a:ext cx="3786463" cy="646331"/>
+          </a:xfrm>
+          <a:prstGeom prst="rect">
+            <a:avLst/>
+          </a:prstGeom>
+          <a:noFill/>
+        </p:spPr>
+        <p:txBody>
+          <a:bodyPr wrap="none" rtlCol="0">
+            <a:spAutoFit/>
+          </a:bodyPr>
+          <a:lstStyle/>
+          <a:p>
+            <a:r>
+              <a:rPr lang="en-US" dirty="0" smtClean="0"/>
+              <a:t>If the post meets the requirements</a:t>
+            </a:r>
+          </a:p>
+          <a:p>
+            <a:r>
+              <a:rPr lang="en-US" dirty="0" smtClean="0"/>
+              <a:t>Then this message will appear</a:t>
+            </a:r>
+            <a:endParaRPr lang="en-US" dirty="0"/>
+          </a:p>
+        </p:txBody>
+      </p:sp>
+    </p:spTree>
+    <p:extLst>
+      <p:ext uri="{BB962C8B-B14F-4D97-AF65-F5344CB8AC3E}">
+        <p14:creationId xmlns:p14="http://schemas.microsoft.com/office/powerpoint/2010/main" val="2741782411"/>
       </p:ext>
     </p:extLst>
   </p:cSld>

</xml_diff>

<commit_message>
fixes a storyboard error
</commit_message>
<xml_diff>
--- a/StoryboardPresentation.pptx
+++ b/StoryboardPresentation.pptx
@@ -338,7 +338,7 @@
           <a:p>
             <a:fld id="{D728701E-CAF4-4159-9B3E-41C86DFFA30D}" type="datetimeFigureOut">
               <a:rPr lang="en-US" smtClean="0"/>
-              <a:t>2014-10-07</a:t>
+              <a:t>2014-10-08</a:t>
             </a:fld>
             <a:endParaRPr lang="en-US"/>
           </a:p>
@@ -1144,7 +1144,7 @@
             <a:fld id="{055FF6D4-D4D7-426A-98F7-170A3668379E}" type="datetime1">
               <a:rPr lang="en-US" smtClean="0"/>
               <a:pPr/>
-              <a:t>2014-10-07</a:t>
+              <a:t>2014-10-08</a:t>
             </a:fld>
             <a:endParaRPr lang="en-US" dirty="0"/>
           </a:p>
@@ -1367,7 +1367,7 @@
             <a:fld id="{4EC5816F-D43D-40D1-9B38-E1A2C18F0972}" type="datetime1">
               <a:rPr lang="en-US" smtClean="0"/>
               <a:pPr/>
-              <a:t>2014-10-07</a:t>
+              <a:t>2014-10-08</a:t>
             </a:fld>
             <a:endParaRPr lang="en-US" dirty="0"/>
           </a:p>
@@ -1913,7 +1913,7 @@
             <a:fld id="{07E45A1C-C0DD-4ED6-B23E-A9D2DD110058}" type="datetime1">
               <a:rPr lang="en-US" smtClean="0"/>
               <a:pPr/>
-              <a:t>2014-10-07</a:t>
+              <a:t>2014-10-08</a:t>
             </a:fld>
             <a:endParaRPr lang="en-US"/>
           </a:p>
@@ -2359,7 +2359,7 @@
             <a:fld id="{A44C1B50-C580-4CB7-BA07-14C66C34B76D}" type="datetime1">
               <a:rPr lang="en-US" smtClean="0"/>
               <a:pPr/>
-              <a:t>2014-10-07</a:t>
+              <a:t>2014-10-08</a:t>
             </a:fld>
             <a:endParaRPr lang="en-US"/>
           </a:p>
@@ -3006,7 +3006,7 @@
           <a:p>
             <a:fld id="{D728701E-CAF4-4159-9B3E-41C86DFFA30D}" type="datetimeFigureOut">
               <a:rPr lang="en-US" smtClean="0"/>
-              <a:t>2014-10-07</a:t>
+              <a:t>2014-10-08</a:t>
             </a:fld>
             <a:endParaRPr lang="en-US"/>
           </a:p>
@@ -3591,7 +3591,7 @@
             <a:fld id="{ED4F1D29-8BEE-49F3-AF49-7A09F617BF67}" type="datetime1">
               <a:rPr lang="en-US" smtClean="0"/>
               <a:pPr/>
-              <a:t>2014-10-07</a:t>
+              <a:t>2014-10-08</a:t>
             </a:fld>
             <a:endParaRPr lang="en-US"/>
           </a:p>
@@ -3919,7 +3919,7 @@
             <a:fld id="{7EB273CF-8910-423E-9890-FC81E25E5084}" type="datetime1">
               <a:rPr lang="en-US" smtClean="0"/>
               <a:pPr/>
-              <a:t>2014-10-07</a:t>
+              <a:t>2014-10-08</a:t>
             </a:fld>
             <a:endParaRPr lang="en-US"/>
           </a:p>
@@ -4527,7 +4527,7 @@
             <a:fld id="{4EC5816F-D43D-40D1-9B38-E1A2C18F0972}" type="datetime1">
               <a:rPr lang="en-US" smtClean="0"/>
               <a:pPr/>
-              <a:t>2014-10-07</a:t>
+              <a:t>2014-10-08</a:t>
             </a:fld>
             <a:endParaRPr lang="en-US" dirty="0"/>
           </a:p>
@@ -4917,7 +4917,7 @@
             <a:fld id="{4EC5816F-D43D-40D1-9B38-E1A2C18F0972}" type="datetime1">
               <a:rPr lang="en-US" smtClean="0"/>
               <a:pPr/>
-              <a:t>2014-10-07</a:t>
+              <a:t>2014-10-08</a:t>
             </a:fld>
             <a:endParaRPr lang="en-US" dirty="0"/>
           </a:p>
@@ -5340,7 +5340,7 @@
             <a:fld id="{4EC5816F-D43D-40D1-9B38-E1A2C18F0972}" type="datetime1">
               <a:rPr lang="en-US" smtClean="0"/>
               <a:pPr/>
-              <a:t>2014-10-07</a:t>
+              <a:t>2014-10-08</a:t>
             </a:fld>
             <a:endParaRPr lang="en-US" dirty="0"/>
           </a:p>
@@ -5891,7 +5891,7 @@
             <a:fld id="{4EC5816F-D43D-40D1-9B38-E1A2C18F0972}" type="datetime1">
               <a:rPr lang="en-US" smtClean="0"/>
               <a:pPr/>
-              <a:t>2014-10-07</a:t>
+              <a:t>2014-10-08</a:t>
             </a:fld>
             <a:endParaRPr lang="en-US" dirty="0"/>
           </a:p>
@@ -6252,7 +6252,7 @@
             <a:fld id="{C45A9071-CFF5-4E3B-B0AB-39782972E256}" type="datetime1">
               <a:rPr lang="en-US" smtClean="0"/>
               <a:pPr/>
-              <a:t>2014-10-07</a:t>
+              <a:t>2014-10-08</a:t>
             </a:fld>
             <a:endParaRPr lang="en-US"/>
           </a:p>
@@ -6777,7 +6777,7 @@
             <a:fld id="{3467CD6D-7520-4B34-A5A3-E8385FA3AFC6}" type="datetime1">
               <a:rPr lang="en-US" smtClean="0"/>
               <a:pPr/>
-              <a:t>2014-10-07</a:t>
+              <a:t>2014-10-08</a:t>
             </a:fld>
             <a:endParaRPr lang="en-US" dirty="0"/>
           </a:p>
@@ -7394,7 +7394,7 @@
             <a:fld id="{53D8BD1F-DE98-4C29-8281-9EC9927620DF}" type="datetime1">
               <a:rPr lang="en-US" smtClean="0"/>
               <a:pPr/>
-              <a:t>2014-10-07</a:t>
+              <a:t>2014-10-08</a:t>
             </a:fld>
             <a:endParaRPr lang="en-US"/>
           </a:p>
@@ -8311,7 +8311,7 @@
             <a:fld id="{055FF6D4-D4D7-426A-98F7-170A3668379E}" type="datetime1">
               <a:rPr lang="en-US" smtClean="0"/>
               <a:pPr/>
-              <a:t>2014-10-07</a:t>
+              <a:t>2014-10-08</a:t>
             </a:fld>
             <a:endParaRPr lang="en-US" dirty="0"/>
           </a:p>
@@ -8567,7 +8567,7 @@
             <a:fld id="{4EC5816F-D43D-40D1-9B38-E1A2C18F0972}" type="datetime1">
               <a:rPr lang="en-US" smtClean="0"/>
               <a:pPr/>
-              <a:t>2014-10-07</a:t>
+              <a:t>2014-10-08</a:t>
             </a:fld>
             <a:endParaRPr lang="en-US" dirty="0"/>
           </a:p>
@@ -8959,7 +8959,7 @@
             <a:fld id="{4EC5816F-D43D-40D1-9B38-E1A2C18F0972}" type="datetime1">
               <a:rPr lang="en-US" smtClean="0"/>
               <a:pPr/>
-              <a:t>2014-10-07</a:t>
+              <a:t>2014-10-08</a:t>
             </a:fld>
             <a:endParaRPr lang="en-US" dirty="0"/>
           </a:p>
@@ -9550,7 +9550,7 @@
             <a:fld id="{42295D47-465E-4A05-802B-049480555B6D}" type="datetime1">
               <a:rPr lang="en-US" smtClean="0"/>
               <a:pPr/>
-              <a:t>2014-10-07</a:t>
+              <a:t>2014-10-08</a:t>
             </a:fld>
             <a:endParaRPr lang="en-US"/>
           </a:p>
@@ -10375,7 +10375,7 @@
             <a:fld id="{64791DB0-D703-40B5-AE3D-532AFE0356D1}" type="datetime1">
               <a:rPr lang="en-US" smtClean="0"/>
               <a:pPr/>
-              <a:t>2014-10-07</a:t>
+              <a:t>2014-10-08</a:t>
             </a:fld>
             <a:endParaRPr lang="en-US"/>
           </a:p>
@@ -11058,7 +11058,7 @@
             <a:fld id="{0F48C029-2200-4EB8-BDE8-5EE0E23571A6}" type="datetime1">
               <a:rPr lang="en-US" smtClean="0"/>
               <a:pPr/>
-              <a:t>2014-10-07</a:t>
+              <a:t>2014-10-08</a:t>
             </a:fld>
             <a:endParaRPr lang="en-US"/>
           </a:p>
@@ -11767,7 +11767,7 @@
             <a:fld id="{4EC5816F-D43D-40D1-9B38-E1A2C18F0972}" type="datetime1">
               <a:rPr lang="en-US" smtClean="0"/>
               <a:pPr/>
-              <a:t>2014-10-07</a:t>
+              <a:t>2014-10-08</a:t>
             </a:fld>
             <a:endParaRPr lang="en-US" dirty="0"/>
           </a:p>
@@ -12190,7 +12190,7 @@
             <a:fld id="{4EC5816F-D43D-40D1-9B38-E1A2C18F0972}" type="datetime1">
               <a:rPr lang="en-US" smtClean="0"/>
               <a:pPr/>
-              <a:t>2014-10-07</a:t>
+              <a:t>2014-10-08</a:t>
             </a:fld>
             <a:endParaRPr lang="en-US" dirty="0"/>
           </a:p>
@@ -12576,7 +12576,7 @@
             <a:fld id="{4EC5816F-D43D-40D1-9B38-E1A2C18F0972}" type="datetime1">
               <a:rPr lang="en-US" smtClean="0"/>
               <a:pPr/>
-              <a:t>2014-10-07</a:t>
+              <a:t>2014-10-08</a:t>
             </a:fld>
             <a:endParaRPr lang="en-US" dirty="0"/>
           </a:p>
@@ -13101,6 +13101,13 @@
     <a:masterClrMapping/>
   </p:clrMapOvr>
   <p:transition xmlns:p14="http://schemas.microsoft.com/office/powerpoint/2010/main"/>
+  <p:timing>
+    <p:tnLst>
+      <p:par>
+        <p:cTn xmlns:p14="http://schemas.microsoft.com/office/powerpoint/2010/main" id="1" dur="indefinite" restart="never" nodeType="tmRoot"/>
+      </p:par>
+    </p:tnLst>
+  </p:timing>
 </p:sld>
 </file>
 
@@ -13146,7 +13153,7 @@
       </p:sp>
       <p:pic>
         <p:nvPicPr>
-          <p:cNvPr id="3" name="Picture 2"/>
+          <p:cNvPr id="4" name="Picture 3"/>
           <p:cNvPicPr>
             <a:picLocks noChangeAspect="1"/>
           </p:cNvPicPr>
@@ -13160,8 +13167,8 @@
         </p:blipFill>
         <p:spPr>
           <a:xfrm>
-            <a:off x="1020298" y="1600200"/>
-            <a:ext cx="7034489" cy="4457951"/>
+            <a:off x="1286593" y="1832548"/>
+            <a:ext cx="5681060" cy="3779516"/>
           </a:xfrm>
           <a:prstGeom prst="rect">
             <a:avLst/>
@@ -13178,14 +13185,21 @@
   <p:clrMapOvr>
     <a:masterClrMapping/>
   </p:clrMapOvr>
-  <mc:AlternateContent xmlns:mc="http://schemas.openxmlformats.org/markup-compatibility/2006">
-    <mc:Choice xmlns:p14="http://schemas.microsoft.com/office/powerpoint/2010/main" Requires="p14">
+  <mc:AlternateContent xmlns:mc="http://schemas.openxmlformats.org/markup-compatibility/2006" xmlns:p14="http://schemas.microsoft.com/office/powerpoint/2010/main">
+    <mc:Choice Requires="p14">
       <p:transition spd="slow" p14:dur="2000"/>
     </mc:Choice>
-    <mc:Fallback>
+    <mc:Fallback xmlns="">
       <p:transition xmlns:p14="http://schemas.microsoft.com/office/powerpoint/2010/main" spd="slow"/>
     </mc:Fallback>
   </mc:AlternateContent>
+  <p:timing>
+    <p:tnLst>
+      <p:par>
+        <p:cTn xmlns:p14="http://schemas.microsoft.com/office/powerpoint/2010/main" id="1" dur="indefinite" restart="never" nodeType="tmRoot"/>
+      </p:par>
+    </p:tnLst>
+  </p:timing>
 </p:sld>
 </file>
 
@@ -13293,14 +13307,21 @@
   <p:clrMapOvr>
     <a:masterClrMapping/>
   </p:clrMapOvr>
-  <mc:AlternateContent xmlns:mc="http://schemas.openxmlformats.org/markup-compatibility/2006">
-    <mc:Choice xmlns:p14="http://schemas.microsoft.com/office/powerpoint/2010/main" Requires="p14">
+  <mc:AlternateContent xmlns:mc="http://schemas.openxmlformats.org/markup-compatibility/2006" xmlns:p14="http://schemas.microsoft.com/office/powerpoint/2010/main">
+    <mc:Choice Requires="p14">
       <p:transition spd="slow" p14:dur="2000"/>
     </mc:Choice>
-    <mc:Fallback>
+    <mc:Fallback xmlns="">
       <p:transition xmlns:p14="http://schemas.microsoft.com/office/powerpoint/2010/main" spd="slow"/>
     </mc:Fallback>
   </mc:AlternateContent>
+  <p:timing>
+    <p:tnLst>
+      <p:par>
+        <p:cTn xmlns:p14="http://schemas.microsoft.com/office/powerpoint/2010/main" id="1" dur="indefinite" restart="never" nodeType="tmRoot"/>
+      </p:par>
+    </p:tnLst>
+  </p:timing>
 </p:sld>
 </file>
 
@@ -13378,14 +13399,21 @@
   <p:clrMapOvr>
     <a:masterClrMapping/>
   </p:clrMapOvr>
-  <mc:AlternateContent xmlns:mc="http://schemas.openxmlformats.org/markup-compatibility/2006">
-    <mc:Choice xmlns:p14="http://schemas.microsoft.com/office/powerpoint/2010/main" Requires="p14">
+  <mc:AlternateContent xmlns:mc="http://schemas.openxmlformats.org/markup-compatibility/2006" xmlns:p14="http://schemas.microsoft.com/office/powerpoint/2010/main">
+    <mc:Choice Requires="p14">
       <p:transition spd="slow" p14:dur="2000"/>
     </mc:Choice>
-    <mc:Fallback>
+    <mc:Fallback xmlns="">
       <p:transition xmlns:p14="http://schemas.microsoft.com/office/powerpoint/2010/main" spd="slow"/>
     </mc:Fallback>
   </mc:AlternateContent>
+  <p:timing>
+    <p:tnLst>
+      <p:par>
+        <p:cTn xmlns:p14="http://schemas.microsoft.com/office/powerpoint/2010/main" id="1" dur="indefinite" restart="never" nodeType="tmRoot"/>
+      </p:par>
+    </p:tnLst>
+  </p:timing>
 </p:sld>
 </file>
 
@@ -13499,14 +13527,21 @@
   <p:clrMapOvr>
     <a:masterClrMapping/>
   </p:clrMapOvr>
-  <mc:AlternateContent xmlns:mc="http://schemas.openxmlformats.org/markup-compatibility/2006">
-    <mc:Choice xmlns:p14="http://schemas.microsoft.com/office/powerpoint/2010/main" Requires="p14">
+  <mc:AlternateContent xmlns:mc="http://schemas.openxmlformats.org/markup-compatibility/2006" xmlns:p14="http://schemas.microsoft.com/office/powerpoint/2010/main">
+    <mc:Choice Requires="p14">
       <p:transition spd="slow" p14:dur="2000"/>
     </mc:Choice>
-    <mc:Fallback>
+    <mc:Fallback xmlns="">
       <p:transition xmlns:p14="http://schemas.microsoft.com/office/powerpoint/2010/main" spd="slow"/>
     </mc:Fallback>
   </mc:AlternateContent>
+  <p:timing>
+    <p:tnLst>
+      <p:par>
+        <p:cTn xmlns:p14="http://schemas.microsoft.com/office/powerpoint/2010/main" id="1" dur="indefinite" restart="never" nodeType="tmRoot"/>
+      </p:par>
+    </p:tnLst>
+  </p:timing>
 </p:sld>
 </file>
 
@@ -13629,14 +13664,21 @@
   <p:clrMapOvr>
     <a:masterClrMapping/>
   </p:clrMapOvr>
-  <mc:AlternateContent xmlns:mc="http://schemas.openxmlformats.org/markup-compatibility/2006">
-    <mc:Choice xmlns:p14="http://schemas.microsoft.com/office/powerpoint/2010/main" Requires="p14">
+  <mc:AlternateContent xmlns:mc="http://schemas.openxmlformats.org/markup-compatibility/2006" xmlns:p14="http://schemas.microsoft.com/office/powerpoint/2010/main">
+    <mc:Choice Requires="p14">
       <p:transition spd="slow" p14:dur="2000"/>
     </mc:Choice>
-    <mc:Fallback>
+    <mc:Fallback xmlns="">
       <p:transition xmlns:p14="http://schemas.microsoft.com/office/powerpoint/2010/main" spd="slow"/>
     </mc:Fallback>
   </mc:AlternateContent>
+  <p:timing>
+    <p:tnLst>
+      <p:par>
+        <p:cTn xmlns:p14="http://schemas.microsoft.com/office/powerpoint/2010/main" id="1" dur="indefinite" restart="never" nodeType="tmRoot"/>
+      </p:par>
+    </p:tnLst>
+  </p:timing>
 </p:sld>
 </file>
 
@@ -13714,14 +13756,21 @@
   <p:clrMapOvr>
     <a:masterClrMapping/>
   </p:clrMapOvr>
-  <mc:AlternateContent xmlns:mc="http://schemas.openxmlformats.org/markup-compatibility/2006">
-    <mc:Choice xmlns:p14="http://schemas.microsoft.com/office/powerpoint/2010/main" Requires="p14">
+  <mc:AlternateContent xmlns:mc="http://schemas.openxmlformats.org/markup-compatibility/2006" xmlns:p14="http://schemas.microsoft.com/office/powerpoint/2010/main">
+    <mc:Choice Requires="p14">
       <p:transition spd="slow" p14:dur="2000"/>
     </mc:Choice>
-    <mc:Fallback>
+    <mc:Fallback xmlns="">
       <p:transition xmlns:p14="http://schemas.microsoft.com/office/powerpoint/2010/main" spd="slow"/>
     </mc:Fallback>
   </mc:AlternateContent>
+  <p:timing>
+    <p:tnLst>
+      <p:par>
+        <p:cTn xmlns:p14="http://schemas.microsoft.com/office/powerpoint/2010/main" id="1" dur="indefinite" restart="never" nodeType="tmRoot"/>
+      </p:par>
+    </p:tnLst>
+  </p:timing>
 </p:sld>
 </file>
 
@@ -13859,14 +13908,21 @@
   <p:clrMapOvr>
     <a:masterClrMapping/>
   </p:clrMapOvr>
-  <mc:AlternateContent xmlns:mc="http://schemas.openxmlformats.org/markup-compatibility/2006">
-    <mc:Choice xmlns:p14="http://schemas.microsoft.com/office/powerpoint/2010/main" Requires="p14">
+  <mc:AlternateContent xmlns:mc="http://schemas.openxmlformats.org/markup-compatibility/2006" xmlns:p14="http://schemas.microsoft.com/office/powerpoint/2010/main">
+    <mc:Choice Requires="p14">
       <p:transition spd="slow" p14:dur="2000"/>
     </mc:Choice>
-    <mc:Fallback>
+    <mc:Fallback xmlns="">
       <p:transition xmlns:p14="http://schemas.microsoft.com/office/powerpoint/2010/main" spd="slow"/>
     </mc:Fallback>
   </mc:AlternateContent>
+  <p:timing>
+    <p:tnLst>
+      <p:par>
+        <p:cTn xmlns:p14="http://schemas.microsoft.com/office/powerpoint/2010/main" id="1" dur="indefinite" restart="never" nodeType="tmRoot"/>
+      </p:par>
+    </p:tnLst>
+  </p:timing>
 </p:sld>
 </file>
 
@@ -13944,14 +14000,21 @@
   <p:clrMapOvr>
     <a:masterClrMapping/>
   </p:clrMapOvr>
-  <mc:AlternateContent xmlns:mc="http://schemas.openxmlformats.org/markup-compatibility/2006">
-    <mc:Choice xmlns:p14="http://schemas.microsoft.com/office/powerpoint/2010/main" Requires="p14">
+  <mc:AlternateContent xmlns:mc="http://schemas.openxmlformats.org/markup-compatibility/2006" xmlns:p14="http://schemas.microsoft.com/office/powerpoint/2010/main">
+    <mc:Choice Requires="p14">
       <p:transition spd="slow" p14:dur="2000"/>
     </mc:Choice>
-    <mc:Fallback>
+    <mc:Fallback xmlns="">
       <p:transition xmlns:p14="http://schemas.microsoft.com/office/powerpoint/2010/main" spd="slow"/>
     </mc:Fallback>
   </mc:AlternateContent>
+  <p:timing>
+    <p:tnLst>
+      <p:par>
+        <p:cTn xmlns:p14="http://schemas.microsoft.com/office/powerpoint/2010/main" id="1" dur="indefinite" restart="never" nodeType="tmRoot"/>
+      </p:par>
+    </p:tnLst>
+  </p:timing>
 </p:sld>
 </file>
 
@@ -14029,14 +14092,21 @@
   <p:clrMapOvr>
     <a:masterClrMapping/>
   </p:clrMapOvr>
-  <mc:AlternateContent xmlns:mc="http://schemas.openxmlformats.org/markup-compatibility/2006">
-    <mc:Choice xmlns:p14="http://schemas.microsoft.com/office/powerpoint/2010/main" Requires="p14">
+  <mc:AlternateContent xmlns:mc="http://schemas.openxmlformats.org/markup-compatibility/2006" xmlns:p14="http://schemas.microsoft.com/office/powerpoint/2010/main">
+    <mc:Choice Requires="p14">
       <p:transition spd="slow" p14:dur="2000"/>
     </mc:Choice>
-    <mc:Fallback>
+    <mc:Fallback xmlns="">
       <p:transition xmlns:p14="http://schemas.microsoft.com/office/powerpoint/2010/main" spd="slow"/>
     </mc:Fallback>
   </mc:AlternateContent>
+  <p:timing>
+    <p:tnLst>
+      <p:par>
+        <p:cTn xmlns:p14="http://schemas.microsoft.com/office/powerpoint/2010/main" id="1" dur="indefinite" restart="never" nodeType="tmRoot"/>
+      </p:par>
+    </p:tnLst>
+  </p:timing>
 </p:sld>
 </file>
 
@@ -14144,14 +14214,21 @@
   <p:clrMapOvr>
     <a:masterClrMapping/>
   </p:clrMapOvr>
-  <mc:AlternateContent xmlns:mc="http://schemas.openxmlformats.org/markup-compatibility/2006">
-    <mc:Choice xmlns:p14="http://schemas.microsoft.com/office/powerpoint/2010/main" Requires="p14">
+  <mc:AlternateContent xmlns:mc="http://schemas.openxmlformats.org/markup-compatibility/2006" xmlns:p14="http://schemas.microsoft.com/office/powerpoint/2010/main">
+    <mc:Choice Requires="p14">
       <p:transition spd="slow" p14:dur="2000"/>
     </mc:Choice>
-    <mc:Fallback>
+    <mc:Fallback xmlns="">
       <p:transition xmlns:p14="http://schemas.microsoft.com/office/powerpoint/2010/main" spd="slow"/>
     </mc:Fallback>
   </mc:AlternateContent>
+  <p:timing>
+    <p:tnLst>
+      <p:par>
+        <p:cTn xmlns:p14="http://schemas.microsoft.com/office/powerpoint/2010/main" id="1" dur="indefinite" restart="never" nodeType="tmRoot"/>
+      </p:par>
+    </p:tnLst>
+  </p:timing>
 </p:sld>
 </file>
 
@@ -14229,14 +14306,21 @@
   <p:clrMapOvr>
     <a:masterClrMapping/>
   </p:clrMapOvr>
-  <mc:AlternateContent xmlns:mc="http://schemas.openxmlformats.org/markup-compatibility/2006">
-    <mc:Choice xmlns:p14="http://schemas.microsoft.com/office/powerpoint/2010/main" Requires="p14">
+  <mc:AlternateContent xmlns:mc="http://schemas.openxmlformats.org/markup-compatibility/2006" xmlns:p14="http://schemas.microsoft.com/office/powerpoint/2010/main">
+    <mc:Choice Requires="p14">
       <p:transition spd="slow" p14:dur="2000"/>
     </mc:Choice>
-    <mc:Fallback>
+    <mc:Fallback xmlns="">
       <p:transition xmlns:p14="http://schemas.microsoft.com/office/powerpoint/2010/main" spd="slow"/>
     </mc:Fallback>
   </mc:AlternateContent>
+  <p:timing>
+    <p:tnLst>
+      <p:par>
+        <p:cTn xmlns:p14="http://schemas.microsoft.com/office/powerpoint/2010/main" id="1" dur="indefinite" restart="never" nodeType="tmRoot"/>
+      </p:par>
+    </p:tnLst>
+  </p:timing>
 </p:sld>
 </file>
 
@@ -14314,14 +14398,21 @@
   <p:clrMapOvr>
     <a:masterClrMapping/>
   </p:clrMapOvr>
-  <mc:AlternateContent xmlns:mc="http://schemas.openxmlformats.org/markup-compatibility/2006">
-    <mc:Choice xmlns:p14="http://schemas.microsoft.com/office/powerpoint/2010/main" Requires="p14">
+  <mc:AlternateContent xmlns:mc="http://schemas.openxmlformats.org/markup-compatibility/2006" xmlns:p14="http://schemas.microsoft.com/office/powerpoint/2010/main">
+    <mc:Choice Requires="p14">
       <p:transition spd="slow" p14:dur="2000"/>
     </mc:Choice>
-    <mc:Fallback>
+    <mc:Fallback xmlns="">
       <p:transition xmlns:p14="http://schemas.microsoft.com/office/powerpoint/2010/main" spd="slow"/>
     </mc:Fallback>
   </mc:AlternateContent>
+  <p:timing>
+    <p:tnLst>
+      <p:par>
+        <p:cTn xmlns:p14="http://schemas.microsoft.com/office/powerpoint/2010/main" id="1" dur="indefinite" restart="never" nodeType="tmRoot"/>
+      </p:par>
+    </p:tnLst>
+  </p:timing>
 </p:sld>
 </file>
 
@@ -14399,14 +14490,21 @@
   <p:clrMapOvr>
     <a:masterClrMapping/>
   </p:clrMapOvr>
-  <mc:AlternateContent xmlns:mc="http://schemas.openxmlformats.org/markup-compatibility/2006">
-    <mc:Choice xmlns:p14="http://schemas.microsoft.com/office/powerpoint/2010/main" Requires="p14">
+  <mc:AlternateContent xmlns:mc="http://schemas.openxmlformats.org/markup-compatibility/2006" xmlns:p14="http://schemas.microsoft.com/office/powerpoint/2010/main">
+    <mc:Choice Requires="p14">
       <p:transition spd="slow" p14:dur="2000"/>
     </mc:Choice>
-    <mc:Fallback>
+    <mc:Fallback xmlns="">
       <p:transition xmlns:p14="http://schemas.microsoft.com/office/powerpoint/2010/main" spd="slow"/>
     </mc:Fallback>
   </mc:AlternateContent>
+  <p:timing>
+    <p:tnLst>
+      <p:par>
+        <p:cTn xmlns:p14="http://schemas.microsoft.com/office/powerpoint/2010/main" id="1" dur="indefinite" restart="never" nodeType="tmRoot"/>
+      </p:par>
+    </p:tnLst>
+  </p:timing>
 </p:sld>
 </file>
 
@@ -14520,14 +14618,21 @@
   <p:clrMapOvr>
     <a:masterClrMapping/>
   </p:clrMapOvr>
-  <mc:AlternateContent xmlns:mc="http://schemas.openxmlformats.org/markup-compatibility/2006">
-    <mc:Choice xmlns:p14="http://schemas.microsoft.com/office/powerpoint/2010/main" Requires="p14">
+  <mc:AlternateContent xmlns:mc="http://schemas.openxmlformats.org/markup-compatibility/2006" xmlns:p14="http://schemas.microsoft.com/office/powerpoint/2010/main">
+    <mc:Choice Requires="p14">
       <p:transition spd="slow" p14:dur="2000"/>
     </mc:Choice>
-    <mc:Fallback>
+    <mc:Fallback xmlns="">
       <p:transition xmlns:p14="http://schemas.microsoft.com/office/powerpoint/2010/main" spd="slow"/>
     </mc:Fallback>
   </mc:AlternateContent>
+  <p:timing>
+    <p:tnLst>
+      <p:par>
+        <p:cTn xmlns:p14="http://schemas.microsoft.com/office/powerpoint/2010/main" id="1" dur="indefinite" restart="never" nodeType="tmRoot"/>
+      </p:par>
+    </p:tnLst>
+  </p:timing>
 </p:sld>
 </file>
 
@@ -14605,14 +14710,21 @@
   <p:clrMapOvr>
     <a:masterClrMapping/>
   </p:clrMapOvr>
-  <mc:AlternateContent xmlns:mc="http://schemas.openxmlformats.org/markup-compatibility/2006">
-    <mc:Choice xmlns:p14="http://schemas.microsoft.com/office/powerpoint/2010/main" Requires="p14">
+  <mc:AlternateContent xmlns:mc="http://schemas.openxmlformats.org/markup-compatibility/2006" xmlns:p14="http://schemas.microsoft.com/office/powerpoint/2010/main">
+    <mc:Choice Requires="p14">
       <p:transition spd="slow" p14:dur="2000"/>
     </mc:Choice>
-    <mc:Fallback>
+    <mc:Fallback xmlns="">
       <p:transition xmlns:p14="http://schemas.microsoft.com/office/powerpoint/2010/main" spd="slow"/>
     </mc:Fallback>
   </mc:AlternateContent>
+  <p:timing>
+    <p:tnLst>
+      <p:par>
+        <p:cTn xmlns:p14="http://schemas.microsoft.com/office/powerpoint/2010/main" id="1" dur="indefinite" restart="never" nodeType="tmRoot"/>
+      </p:par>
+    </p:tnLst>
+  </p:timing>
 </p:sld>
 </file>
 
@@ -14690,6 +14802,13 @@
   <p:clrMapOvr>
     <a:masterClrMapping/>
   </p:clrMapOvr>
+  <p:timing>
+    <p:tnLst>
+      <p:par>
+        <p:cTn xmlns:p14="http://schemas.microsoft.com/office/powerpoint/2010/main" id="1" dur="indefinite" restart="never" nodeType="tmRoot"/>
+      </p:par>
+    </p:tnLst>
+  </p:timing>
 </p:sld>
 </file>
 
@@ -14797,6 +14916,13 @@
   <p:clrMapOvr>
     <a:masterClrMapping/>
   </p:clrMapOvr>
+  <p:timing>
+    <p:tnLst>
+      <p:par>
+        <p:cTn xmlns:p14="http://schemas.microsoft.com/office/powerpoint/2010/main" id="1" dur="indefinite" restart="never" nodeType="tmRoot"/>
+      </p:par>
+    </p:tnLst>
+  </p:timing>
 </p:sld>
 </file>
 
@@ -14878,6 +15004,13 @@
   <p:clrMapOvr>
     <a:masterClrMapping/>
   </p:clrMapOvr>
+  <p:timing>
+    <p:tnLst>
+      <p:par>
+        <p:cTn xmlns:p14="http://schemas.microsoft.com/office/powerpoint/2010/main" id="1" dur="indefinite" restart="never" nodeType="tmRoot"/>
+      </p:par>
+    </p:tnLst>
+  </p:timing>
 </p:sld>
 </file>
 
@@ -14959,6 +15092,13 @@
   <p:clrMapOvr>
     <a:masterClrMapping/>
   </p:clrMapOvr>
+  <p:timing>
+    <p:tnLst>
+      <p:par>
+        <p:cTn xmlns:p14="http://schemas.microsoft.com/office/powerpoint/2010/main" id="1" dur="indefinite" restart="never" nodeType="tmRoot"/>
+      </p:par>
+    </p:tnLst>
+  </p:timing>
 </p:sld>
 </file>
 
@@ -15036,6 +15176,13 @@
   <p:clrMapOvr>
     <a:masterClrMapping/>
   </p:clrMapOvr>
+  <p:timing>
+    <p:tnLst>
+      <p:par>
+        <p:cTn xmlns:p14="http://schemas.microsoft.com/office/powerpoint/2010/main" id="1" dur="indefinite" restart="never" nodeType="tmRoot"/>
+      </p:par>
+    </p:tnLst>
+  </p:timing>
 </p:sld>
 </file>
 
@@ -15113,6 +15260,13 @@
   <p:clrMapOvr>
     <a:masterClrMapping/>
   </p:clrMapOvr>
+  <p:timing>
+    <p:tnLst>
+      <p:par>
+        <p:cTn xmlns:p14="http://schemas.microsoft.com/office/powerpoint/2010/main" id="1" dur="indefinite" restart="never" nodeType="tmRoot"/>
+      </p:par>
+    </p:tnLst>
+  </p:timing>
 </p:sld>
 </file>
 
@@ -15190,14 +15344,21 @@
   <p:clrMapOvr>
     <a:masterClrMapping/>
   </p:clrMapOvr>
-  <mc:AlternateContent xmlns:mc="http://schemas.openxmlformats.org/markup-compatibility/2006">
-    <mc:Choice xmlns:p14="http://schemas.microsoft.com/office/powerpoint/2010/main" Requires="p14">
+  <mc:AlternateContent xmlns:mc="http://schemas.openxmlformats.org/markup-compatibility/2006" xmlns:p14="http://schemas.microsoft.com/office/powerpoint/2010/main">
+    <mc:Choice Requires="p14">
       <p:transition spd="slow" p14:dur="2000"/>
     </mc:Choice>
-    <mc:Fallback>
+    <mc:Fallback xmlns="">
       <p:transition xmlns:p14="http://schemas.microsoft.com/office/powerpoint/2010/main" spd="slow"/>
     </mc:Fallback>
   </mc:AlternateContent>
+  <p:timing>
+    <p:tnLst>
+      <p:par>
+        <p:cTn xmlns:p14="http://schemas.microsoft.com/office/powerpoint/2010/main" id="1" dur="indefinite" restart="never" nodeType="tmRoot"/>
+      </p:par>
+    </p:tnLst>
+  </p:timing>
 </p:sld>
 </file>
 
@@ -15275,6 +15436,13 @@
   <p:clrMapOvr>
     <a:masterClrMapping/>
   </p:clrMapOvr>
+  <p:timing>
+    <p:tnLst>
+      <p:par>
+        <p:cTn xmlns:p14="http://schemas.microsoft.com/office/powerpoint/2010/main" id="1" dur="indefinite" restart="never" nodeType="tmRoot"/>
+      </p:par>
+    </p:tnLst>
+  </p:timing>
 </p:sld>
 </file>
 
@@ -15352,6 +15520,13 @@
   <p:clrMapOvr>
     <a:masterClrMapping/>
   </p:clrMapOvr>
+  <p:timing>
+    <p:tnLst>
+      <p:par>
+        <p:cTn xmlns:p14="http://schemas.microsoft.com/office/powerpoint/2010/main" id="1" dur="indefinite" restart="never" nodeType="tmRoot"/>
+      </p:par>
+    </p:tnLst>
+  </p:timing>
 </p:sld>
 </file>
 
@@ -15429,14 +15604,21 @@
   <p:clrMapOvr>
     <a:masterClrMapping/>
   </p:clrMapOvr>
-  <mc:AlternateContent xmlns:mc="http://schemas.openxmlformats.org/markup-compatibility/2006">
-    <mc:Choice xmlns:p14="http://schemas.microsoft.com/office/powerpoint/2010/main" Requires="p14">
+  <mc:AlternateContent xmlns:mc="http://schemas.openxmlformats.org/markup-compatibility/2006" xmlns:p14="http://schemas.microsoft.com/office/powerpoint/2010/main">
+    <mc:Choice Requires="p14">
       <p:transition spd="slow" p14:dur="2000"/>
     </mc:Choice>
-    <mc:Fallback>
+    <mc:Fallback xmlns="">
       <p:transition xmlns:p14="http://schemas.microsoft.com/office/powerpoint/2010/main" spd="slow"/>
     </mc:Fallback>
   </mc:AlternateContent>
+  <p:timing>
+    <p:tnLst>
+      <p:par>
+        <p:cTn xmlns:p14="http://schemas.microsoft.com/office/powerpoint/2010/main" id="1" dur="indefinite" restart="never" nodeType="tmRoot"/>
+      </p:par>
+    </p:tnLst>
+  </p:timing>
 </p:sld>
 </file>
 
@@ -15544,14 +15726,21 @@
   <p:clrMapOvr>
     <a:masterClrMapping/>
   </p:clrMapOvr>
-  <mc:AlternateContent xmlns:mc="http://schemas.openxmlformats.org/markup-compatibility/2006">
-    <mc:Choice xmlns:p14="http://schemas.microsoft.com/office/powerpoint/2010/main" Requires="p14">
+  <mc:AlternateContent xmlns:mc="http://schemas.openxmlformats.org/markup-compatibility/2006" xmlns:p14="http://schemas.microsoft.com/office/powerpoint/2010/main">
+    <mc:Choice Requires="p14">
       <p:transition spd="slow" p14:dur="2000"/>
     </mc:Choice>
-    <mc:Fallback>
+    <mc:Fallback xmlns="">
       <p:transition xmlns:p14="http://schemas.microsoft.com/office/powerpoint/2010/main" spd="slow"/>
     </mc:Fallback>
   </mc:AlternateContent>
+  <p:timing>
+    <p:tnLst>
+      <p:par>
+        <p:cTn xmlns:p14="http://schemas.microsoft.com/office/powerpoint/2010/main" id="1" dur="indefinite" restart="never" nodeType="tmRoot"/>
+      </p:par>
+    </p:tnLst>
+  </p:timing>
 </p:sld>
 </file>
 
@@ -15629,14 +15818,21 @@
   <p:clrMapOvr>
     <a:masterClrMapping/>
   </p:clrMapOvr>
-  <mc:AlternateContent xmlns:mc="http://schemas.openxmlformats.org/markup-compatibility/2006">
-    <mc:Choice xmlns:p14="http://schemas.microsoft.com/office/powerpoint/2010/main" Requires="p14">
+  <mc:AlternateContent xmlns:mc="http://schemas.openxmlformats.org/markup-compatibility/2006" xmlns:p14="http://schemas.microsoft.com/office/powerpoint/2010/main">
+    <mc:Choice Requires="p14">
       <p:transition spd="slow" p14:dur="2000"/>
     </mc:Choice>
-    <mc:Fallback>
+    <mc:Fallback xmlns="">
       <p:transition xmlns:p14="http://schemas.microsoft.com/office/powerpoint/2010/main" spd="slow"/>
     </mc:Fallback>
   </mc:AlternateContent>
+  <p:timing>
+    <p:tnLst>
+      <p:par>
+        <p:cTn xmlns:p14="http://schemas.microsoft.com/office/powerpoint/2010/main" id="1" dur="indefinite" restart="never" nodeType="tmRoot"/>
+      </p:par>
+    </p:tnLst>
+  </p:timing>
 </p:sld>
 </file>
 
@@ -15714,14 +15910,21 @@
   <p:clrMapOvr>
     <a:masterClrMapping/>
   </p:clrMapOvr>
-  <mc:AlternateContent xmlns:mc="http://schemas.openxmlformats.org/markup-compatibility/2006">
-    <mc:Choice xmlns:p14="http://schemas.microsoft.com/office/powerpoint/2010/main" Requires="p14">
+  <mc:AlternateContent xmlns:mc="http://schemas.openxmlformats.org/markup-compatibility/2006" xmlns:p14="http://schemas.microsoft.com/office/powerpoint/2010/main">
+    <mc:Choice Requires="p14">
       <p:transition spd="slow" p14:dur="2000"/>
     </mc:Choice>
-    <mc:Fallback>
+    <mc:Fallback xmlns="">
       <p:transition xmlns:p14="http://schemas.microsoft.com/office/powerpoint/2010/main" spd="slow"/>
     </mc:Fallback>
   </mc:AlternateContent>
+  <p:timing>
+    <p:tnLst>
+      <p:par>
+        <p:cTn xmlns:p14="http://schemas.microsoft.com/office/powerpoint/2010/main" id="1" dur="indefinite" restart="never" nodeType="tmRoot"/>
+      </p:par>
+    </p:tnLst>
+  </p:timing>
 </p:sld>
 </file>
 
@@ -15835,14 +16038,21 @@
   <p:clrMapOvr>
     <a:masterClrMapping/>
   </p:clrMapOvr>
-  <mc:AlternateContent xmlns:mc="http://schemas.openxmlformats.org/markup-compatibility/2006">
-    <mc:Choice xmlns:p14="http://schemas.microsoft.com/office/powerpoint/2010/main" Requires="p14">
+  <mc:AlternateContent xmlns:mc="http://schemas.openxmlformats.org/markup-compatibility/2006" xmlns:p14="http://schemas.microsoft.com/office/powerpoint/2010/main">
+    <mc:Choice Requires="p14">
       <p:transition spd="slow" p14:dur="2000"/>
     </mc:Choice>
-    <mc:Fallback>
+    <mc:Fallback xmlns="">
       <p:transition xmlns:p14="http://schemas.microsoft.com/office/powerpoint/2010/main" spd="slow"/>
     </mc:Fallback>
   </mc:AlternateContent>
+  <p:timing>
+    <p:tnLst>
+      <p:par>
+        <p:cTn xmlns:p14="http://schemas.microsoft.com/office/powerpoint/2010/main" id="1" dur="indefinite" restart="never" nodeType="tmRoot"/>
+      </p:par>
+    </p:tnLst>
+  </p:timing>
 </p:sld>
 </file>
 
@@ -15956,14 +16166,21 @@
   <p:clrMapOvr>
     <a:masterClrMapping/>
   </p:clrMapOvr>
-  <mc:AlternateContent xmlns:mc="http://schemas.openxmlformats.org/markup-compatibility/2006">
-    <mc:Choice xmlns:p14="http://schemas.microsoft.com/office/powerpoint/2010/main" Requires="p14">
+  <mc:AlternateContent xmlns:mc="http://schemas.openxmlformats.org/markup-compatibility/2006" xmlns:p14="http://schemas.microsoft.com/office/powerpoint/2010/main">
+    <mc:Choice Requires="p14">
       <p:transition spd="slow" p14:dur="2000"/>
     </mc:Choice>
-    <mc:Fallback>
+    <mc:Fallback xmlns="">
       <p:transition xmlns:p14="http://schemas.microsoft.com/office/powerpoint/2010/main" spd="slow"/>
     </mc:Fallback>
   </mc:AlternateContent>
+  <p:timing>
+    <p:tnLst>
+      <p:par>
+        <p:cTn xmlns:p14="http://schemas.microsoft.com/office/powerpoint/2010/main" id="1" dur="indefinite" restart="never" nodeType="tmRoot"/>
+      </p:par>
+    </p:tnLst>
+  </p:timing>
 </p:sld>
 </file>
 

</xml_diff>

<commit_message>
adds a connectivity message and some clarity tweaks to the storyboard
</commit_message>
<xml_diff>
--- a/StoryboardPresentation.pptx
+++ b/StoryboardPresentation.pptx
@@ -36,6 +36,7 @@
     <p:sldId id="285" r:id="rId30"/>
     <p:sldId id="286" r:id="rId31"/>
     <p:sldId id="287" r:id="rId32"/>
+    <p:sldId id="288" r:id="rId33"/>
   </p:sldIdLst>
   <p:sldSz cx="9144000" cy="6858000" type="screen4x3"/>
   <p:notesSz cx="6858000" cy="9144000"/>
@@ -14700,6 +14701,41 @@
           </a:prstGeom>
         </p:spPr>
       </p:pic>
+      <p:sp>
+        <p:nvSpPr>
+          <p:cNvPr id="4" name="Rectangle 3"/>
+          <p:cNvSpPr/>
+          <p:nvPr/>
+        </p:nvSpPr>
+        <p:spPr>
+          <a:xfrm>
+            <a:off x="0" y="4292355"/>
+            <a:ext cx="3074456" cy="923330"/>
+          </a:xfrm>
+          <a:prstGeom prst="rect">
+            <a:avLst/>
+          </a:prstGeom>
+        </p:spPr>
+        <p:txBody>
+          <a:bodyPr wrap="square">
+            <a:spAutoFit/>
+          </a:bodyPr>
+          <a:lstStyle/>
+          <a:p>
+            <a:r>
+              <a:rPr lang="en-US" dirty="0"/>
+              <a:t>Click the back button to return to the </a:t>
+            </a:r>
+          </a:p>
+          <a:p>
+            <a:r>
+              <a:rPr lang="en-US" dirty="0" smtClean="0"/>
+              <a:t>List of Questions</a:t>
+            </a:r>
+            <a:endParaRPr lang="en-US" dirty="0"/>
+          </a:p>
+        </p:txBody>
+      </p:sp>
     </p:spTree>
     <p:extLst>
       <p:ext uri="{BB962C8B-B14F-4D97-AF65-F5344CB8AC3E}">
@@ -14906,6 +14942,41 @@
           </a:p>
         </p:txBody>
       </p:sp>
+      <p:sp>
+        <p:nvSpPr>
+          <p:cNvPr id="4" name="Rectangle 3"/>
+          <p:cNvSpPr/>
+          <p:nvPr/>
+        </p:nvSpPr>
+        <p:spPr>
+          <a:xfrm>
+            <a:off x="4391334" y="3752166"/>
+            <a:ext cx="4572000" cy="646331"/>
+          </a:xfrm>
+          <a:prstGeom prst="rect">
+            <a:avLst/>
+          </a:prstGeom>
+        </p:spPr>
+        <p:txBody>
+          <a:bodyPr>
+            <a:spAutoFit/>
+          </a:bodyPr>
+          <a:lstStyle/>
+          <a:p>
+            <a:r>
+              <a:rPr lang="en-US" dirty="0"/>
+              <a:t>Click the back button to return to the </a:t>
+            </a:r>
+          </a:p>
+          <a:p>
+            <a:r>
+              <a:rPr lang="en-US" dirty="0" smtClean="0"/>
+              <a:t>Ask screen</a:t>
+            </a:r>
+            <a:endParaRPr lang="en-US" dirty="0"/>
+          </a:p>
+        </p:txBody>
+      </p:sp>
     </p:spTree>
     <p:extLst>
       <p:ext uri="{BB962C8B-B14F-4D97-AF65-F5344CB8AC3E}">
@@ -15082,6 +15153,45 @@
           </a:prstGeom>
         </p:spPr>
       </p:pic>
+      <p:sp>
+        <p:nvSpPr>
+          <p:cNvPr id="4" name="Rectangle 3"/>
+          <p:cNvSpPr/>
+          <p:nvPr/>
+        </p:nvSpPr>
+        <p:spPr>
+          <a:xfrm>
+            <a:off x="3911681" y="3103323"/>
+            <a:ext cx="4572000" cy="646331"/>
+          </a:xfrm>
+          <a:prstGeom prst="rect">
+            <a:avLst/>
+          </a:prstGeom>
+        </p:spPr>
+        <p:txBody>
+          <a:bodyPr>
+            <a:spAutoFit/>
+          </a:bodyPr>
+          <a:lstStyle/>
+          <a:p>
+            <a:r>
+              <a:rPr lang="en-US" dirty="0"/>
+              <a:t>Click the back button to return to the </a:t>
+            </a:r>
+          </a:p>
+          <a:p>
+            <a:r>
+              <a:rPr lang="en-US" dirty="0" err="1"/>
+              <a:t>MyProfile</a:t>
+            </a:r>
+            <a:r>
+              <a:rPr lang="en-US" dirty="0"/>
+              <a:t> options</a:t>
+            </a:r>
+            <a:endParaRPr lang="en-US" dirty="0"/>
+          </a:p>
+        </p:txBody>
+      </p:sp>
     </p:spTree>
     <p:extLst>
       <p:ext uri="{BB962C8B-B14F-4D97-AF65-F5344CB8AC3E}">
@@ -15250,6 +15360,45 @@
           </a:prstGeom>
         </p:spPr>
       </p:pic>
+      <p:sp>
+        <p:nvSpPr>
+          <p:cNvPr id="4" name="Rectangle 3"/>
+          <p:cNvSpPr/>
+          <p:nvPr/>
+        </p:nvSpPr>
+        <p:spPr>
+          <a:xfrm>
+            <a:off x="4572000" y="2905296"/>
+            <a:ext cx="4572000" cy="646331"/>
+          </a:xfrm>
+          <a:prstGeom prst="rect">
+            <a:avLst/>
+          </a:prstGeom>
+        </p:spPr>
+        <p:txBody>
+          <a:bodyPr>
+            <a:spAutoFit/>
+          </a:bodyPr>
+          <a:lstStyle/>
+          <a:p>
+            <a:r>
+              <a:rPr lang="en-US" dirty="0"/>
+              <a:t>Click the back button to return to the </a:t>
+            </a:r>
+          </a:p>
+          <a:p>
+            <a:r>
+              <a:rPr lang="en-US" dirty="0" err="1"/>
+              <a:t>MyProfile</a:t>
+            </a:r>
+            <a:r>
+              <a:rPr lang="en-US" dirty="0"/>
+              <a:t> options</a:t>
+            </a:r>
+            <a:endParaRPr lang="en-US" dirty="0"/>
+          </a:p>
+        </p:txBody>
+      </p:sp>
     </p:spTree>
     <p:extLst>
       <p:ext uri="{BB962C8B-B14F-4D97-AF65-F5344CB8AC3E}">
@@ -15510,6 +15659,46 @@
           </a:prstGeom>
         </p:spPr>
       </p:pic>
+      <p:sp>
+        <p:nvSpPr>
+          <p:cNvPr id="4" name="TextBox 3"/>
+          <p:cNvSpPr txBox="1"/>
+          <p:nvPr/>
+        </p:nvSpPr>
+        <p:spPr>
+          <a:xfrm>
+            <a:off x="4762065" y="3409155"/>
+            <a:ext cx="4081090" cy="646331"/>
+          </a:xfrm>
+          <a:prstGeom prst="rect">
+            <a:avLst/>
+          </a:prstGeom>
+          <a:noFill/>
+        </p:spPr>
+        <p:txBody>
+          <a:bodyPr wrap="none" rtlCol="0">
+            <a:spAutoFit/>
+          </a:bodyPr>
+          <a:lstStyle/>
+          <a:p>
+            <a:r>
+              <a:rPr lang="en-US" dirty="0" smtClean="0"/>
+              <a:t>Click the back button to return to the </a:t>
+            </a:r>
+          </a:p>
+          <a:p>
+            <a:r>
+              <a:rPr lang="en-US" dirty="0" err="1" smtClean="0"/>
+              <a:t>MyProfile</a:t>
+            </a:r>
+            <a:r>
+              <a:rPr lang="en-US" dirty="0" smtClean="0"/>
+              <a:t> options</a:t>
+            </a:r>
+            <a:endParaRPr lang="en-US" dirty="0"/>
+          </a:p>
+        </p:txBody>
+      </p:sp>
     </p:spTree>
     <p:extLst>
       <p:ext uri="{BB962C8B-B14F-4D97-AF65-F5344CB8AC3E}">
@@ -15527,6 +15716,113 @@
       </p:par>
     </p:tnLst>
   </p:timing>
+</p:sld>
+</file>
+
+<file path=ppt/slides/slide32.xml><?xml version="1.0" encoding="utf-8"?>
+<p:sld xmlns:a="http://schemas.openxmlformats.org/drawingml/2006/main" xmlns:r="http://schemas.openxmlformats.org/officeDocument/2006/relationships" xmlns:p="http://schemas.openxmlformats.org/presentationml/2006/main">
+  <p:cSld>
+    <p:spTree>
+      <p:nvGrpSpPr>
+        <p:cNvPr id="1" name=""/>
+        <p:cNvGrpSpPr/>
+        <p:nvPr/>
+      </p:nvGrpSpPr>
+      <p:grpSpPr>
+        <a:xfrm>
+          <a:off x="0" y="0"/>
+          <a:ext cx="0" cy="0"/>
+          <a:chOff x="0" y="0"/>
+          <a:chExt cx="0" cy="0"/>
+        </a:xfrm>
+      </p:grpSpPr>
+      <p:sp>
+        <p:nvSpPr>
+          <p:cNvPr id="2" name="Title 1"/>
+          <p:cNvSpPr>
+            <a:spLocks noGrp="1"/>
+          </p:cNvSpPr>
+          <p:nvPr>
+            <p:ph type="title"/>
+          </p:nvPr>
+        </p:nvSpPr>
+        <p:spPr/>
+        <p:txBody>
+          <a:bodyPr/>
+          <a:lstStyle/>
+          <a:p>
+            <a:r>
+              <a:rPr lang="en-US" dirty="0" smtClean="0"/>
+              <a:t>Loss of Connectivity</a:t>
+            </a:r>
+            <a:endParaRPr lang="en-US" dirty="0"/>
+          </a:p>
+        </p:txBody>
+      </p:sp>
+      <p:pic>
+        <p:nvPicPr>
+          <p:cNvPr id="4" name="Picture 3"/>
+          <p:cNvPicPr>
+            <a:picLocks noChangeAspect="1"/>
+          </p:cNvPicPr>
+          <p:nvPr/>
+        </p:nvPicPr>
+        <p:blipFill>
+          <a:blip r:embed="rId2"/>
+          <a:stretch>
+            <a:fillRect/>
+          </a:stretch>
+        </p:blipFill>
+        <p:spPr>
+          <a:xfrm>
+            <a:off x="1393575" y="1428324"/>
+            <a:ext cx="2724652" cy="5179001"/>
+          </a:xfrm>
+          <a:prstGeom prst="rect">
+            <a:avLst/>
+          </a:prstGeom>
+        </p:spPr>
+      </p:pic>
+      <p:sp>
+        <p:nvSpPr>
+          <p:cNvPr id="5" name="TextBox 4"/>
+          <p:cNvSpPr txBox="1"/>
+          <p:nvPr/>
+        </p:nvSpPr>
+        <p:spPr>
+          <a:xfrm>
+            <a:off x="3408636" y="4495405"/>
+            <a:ext cx="3957897" cy="369332"/>
+          </a:xfrm>
+          <a:prstGeom prst="rect">
+            <a:avLst/>
+          </a:prstGeom>
+          <a:noFill/>
+        </p:spPr>
+        <p:txBody>
+          <a:bodyPr wrap="none" rtlCol="0">
+            <a:spAutoFit/>
+          </a:bodyPr>
+          <a:lstStyle/>
+          <a:p>
+            <a:r>
+              <a:rPr lang="en-US" dirty="0" smtClean="0"/>
+              <a:t>Clicking OK dismisses the message</a:t>
+            </a:r>
+            <a:endParaRPr lang="en-US" dirty="0"/>
+          </a:p>
+        </p:txBody>
+      </p:sp>
+    </p:spTree>
+    <p:extLst>
+      <p:ext uri="{BB962C8B-B14F-4D97-AF65-F5344CB8AC3E}">
+        <p14:creationId xmlns:p14="http://schemas.microsoft.com/office/powerpoint/2010/main" val="1228782339"/>
+      </p:ext>
+    </p:extLst>
+  </p:cSld>
+  <p:clrMapOvr>
+    <a:masterClrMapping/>
+  </p:clrMapOvr>
 </p:sld>
 </file>
 
@@ -15808,6 +16104,39 @@
           </a:prstGeom>
         </p:spPr>
       </p:pic>
+      <p:sp>
+        <p:nvSpPr>
+          <p:cNvPr id="4" name="Rectangle 3"/>
+          <p:cNvSpPr/>
+          <p:nvPr/>
+        </p:nvSpPr>
+        <p:spPr>
+          <a:xfrm>
+            <a:off x="5343747" y="3086611"/>
+            <a:ext cx="3613326" cy="646331"/>
+          </a:xfrm>
+          <a:prstGeom prst="rect">
+            <a:avLst/>
+          </a:prstGeom>
+        </p:spPr>
+        <p:txBody>
+          <a:bodyPr wrap="square">
+            <a:spAutoFit/>
+          </a:bodyPr>
+          <a:lstStyle/>
+          <a:p>
+            <a:r>
+              <a:rPr lang="en-US" dirty="0"/>
+              <a:t>Click the back button </a:t>
+            </a:r>
+            <a:r>
+              <a:rPr lang="en-US" dirty="0" smtClean="0"/>
+              <a:t>to cancel and return to the ask screen</a:t>
+            </a:r>
+            <a:endParaRPr lang="en-US" dirty="0"/>
+          </a:p>
+        </p:txBody>
+      </p:sp>
     </p:spTree>
     <p:extLst>
       <p:ext uri="{BB962C8B-B14F-4D97-AF65-F5344CB8AC3E}">
@@ -16001,7 +16330,7 @@
         <p:spPr>
           <a:xfrm>
             <a:off x="3993451" y="2567931"/>
-            <a:ext cx="4853500" cy="646331"/>
+            <a:ext cx="4853500" cy="923330"/>
           </a:xfrm>
           <a:prstGeom prst="rect">
             <a:avLst/>
@@ -16022,7 +16351,17 @@
           <a:p>
             <a:r>
               <a:rPr lang="en-US" dirty="0" smtClean="0"/>
-              <a:t>Add is &gt;64kB then, this message will appear</a:t>
+              <a:t>Add is &gt;64kB then, this message will </a:t>
+            </a:r>
+            <a:r>
+              <a:rPr lang="en-US" dirty="0" smtClean="0"/>
+              <a:t>appear</a:t>
+            </a:r>
+          </a:p>
+          <a:p>
+            <a:r>
+              <a:rPr lang="en-US" dirty="0" smtClean="0"/>
+              <a:t>And then fade in a couple seconds</a:t>
             </a:r>
             <a:endParaRPr lang="en-US" dirty="0"/>
           </a:p>
@@ -16129,7 +16468,7 @@
         <p:spPr>
           <a:xfrm>
             <a:off x="4268324" y="3236620"/>
-            <a:ext cx="3786463" cy="646331"/>
+            <a:ext cx="4647914" cy="923330"/>
           </a:xfrm>
           <a:prstGeom prst="rect">
             <a:avLst/>
@@ -16150,9 +16489,22 @@
           <a:p>
             <a:r>
               <a:rPr lang="en-US" dirty="0" smtClean="0"/>
-              <a:t>Then this message will appear</a:t>
-            </a:r>
-            <a:endParaRPr lang="en-US" dirty="0"/>
+              <a:t>Then this message will </a:t>
+            </a:r>
+            <a:r>
+              <a:rPr lang="en-US" dirty="0" smtClean="0"/>
+              <a:t>appear and </a:t>
+            </a:r>
+            <a:r>
+              <a:rPr lang="en-US" dirty="0" smtClean="0"/>
+              <a:t>fade in</a:t>
+            </a:r>
+          </a:p>
+          <a:p>
+            <a:r>
+              <a:rPr lang="en-US" dirty="0" smtClean="0"/>
+              <a:t>A few seconds</a:t>
+            </a:r>
           </a:p>
         </p:txBody>
       </p:sp>

</xml_diff>